<commit_message>
Updated documentation adnd added License related files
</commit_message>
<xml_diff>
--- a/misc/code.pptx
+++ b/misc/code.pptx
@@ -4,6 +4,9 @@
   <p:sldMasterIdLst>
     <p:sldMasterId id="2147483648" r:id="rId1"/>
   </p:sldMasterIdLst>
+  <p:notesMasterIdLst>
+    <p:notesMasterId r:id="rId15"/>
+  </p:notesMasterIdLst>
   <p:sldIdLst>
     <p:sldId id="264" r:id="rId2"/>
     <p:sldId id="257" r:id="rId3"/>
@@ -13,6 +16,11 @@
     <p:sldId id="261" r:id="rId7"/>
     <p:sldId id="262" r:id="rId8"/>
     <p:sldId id="265" r:id="rId9"/>
+    <p:sldId id="267" r:id="rId10"/>
+    <p:sldId id="266" r:id="rId11"/>
+    <p:sldId id="268" r:id="rId12"/>
+    <p:sldId id="269" r:id="rId13"/>
+    <p:sldId id="270" r:id="rId14"/>
   </p:sldIdLst>
   <p:sldSz cx="12192000" cy="6858000"/>
   <p:notesSz cx="6858000" cy="9144000"/>
@@ -117,6 +125,523 @@
     </p:ext>
   </p:extLst>
 </p:presentation>
+</file>
+
+<file path=ppt/notesMasters/notesMaster1.xml><?xml version="1.0" encoding="utf-8"?>
+<p:notesMaster xmlns:a="http://schemas.openxmlformats.org/drawingml/2006/main" xmlns:r="http://schemas.openxmlformats.org/officeDocument/2006/relationships" xmlns:p="http://schemas.openxmlformats.org/presentationml/2006/main">
+  <p:cSld>
+    <p:bg>
+      <p:bgRef idx="1001">
+        <a:schemeClr val="bg1"/>
+      </p:bgRef>
+    </p:bg>
+    <p:spTree>
+      <p:nvGrpSpPr>
+        <p:cNvPr id="1" name=""/>
+        <p:cNvGrpSpPr/>
+        <p:nvPr/>
+      </p:nvGrpSpPr>
+      <p:grpSpPr>
+        <a:xfrm>
+          <a:off x="0" y="0"/>
+          <a:ext cx="0" cy="0"/>
+          <a:chOff x="0" y="0"/>
+          <a:chExt cx="0" cy="0"/>
+        </a:xfrm>
+      </p:grpSpPr>
+      <p:sp>
+        <p:nvSpPr>
+          <p:cNvPr id="2" name="Header Placeholder 1"/>
+          <p:cNvSpPr>
+            <a:spLocks noGrp="1"/>
+          </p:cNvSpPr>
+          <p:nvPr>
+            <p:ph type="hdr" sz="quarter"/>
+          </p:nvPr>
+        </p:nvSpPr>
+        <p:spPr>
+          <a:xfrm>
+            <a:off x="0" y="0"/>
+            <a:ext cx="2971800" cy="458788"/>
+          </a:xfrm>
+          <a:prstGeom prst="rect">
+            <a:avLst/>
+          </a:prstGeom>
+        </p:spPr>
+        <p:txBody>
+          <a:bodyPr vert="horz" lIns="91440" tIns="45720" rIns="91440" bIns="45720" rtlCol="0"/>
+          <a:lstStyle>
+            <a:lvl1pPr algn="l">
+              <a:defRPr sz="1200"/>
+            </a:lvl1pPr>
+          </a:lstStyle>
+          <a:p>
+            <a:endParaRPr lang="en-US"/>
+          </a:p>
+        </p:txBody>
+      </p:sp>
+      <p:sp>
+        <p:nvSpPr>
+          <p:cNvPr id="3" name="Date Placeholder 2"/>
+          <p:cNvSpPr>
+            <a:spLocks noGrp="1"/>
+          </p:cNvSpPr>
+          <p:nvPr>
+            <p:ph type="dt" idx="1"/>
+          </p:nvPr>
+        </p:nvSpPr>
+        <p:spPr>
+          <a:xfrm>
+            <a:off x="3884613" y="0"/>
+            <a:ext cx="2971800" cy="458788"/>
+          </a:xfrm>
+          <a:prstGeom prst="rect">
+            <a:avLst/>
+          </a:prstGeom>
+        </p:spPr>
+        <p:txBody>
+          <a:bodyPr vert="horz" lIns="91440" tIns="45720" rIns="91440" bIns="45720" rtlCol="0"/>
+          <a:lstStyle>
+            <a:lvl1pPr algn="r">
+              <a:defRPr sz="1200"/>
+            </a:lvl1pPr>
+          </a:lstStyle>
+          <a:p>
+            <a:fld id="{0DCAB2E6-51C4-F441-A568-A22ABBC589BB}" type="datetimeFigureOut">
+              <a:rPr lang="en-US" smtClean="0"/>
+              <a:t>7/24/19</a:t>
+            </a:fld>
+            <a:endParaRPr lang="en-US"/>
+          </a:p>
+        </p:txBody>
+      </p:sp>
+      <p:sp>
+        <p:nvSpPr>
+          <p:cNvPr id="4" name="Slide Image Placeholder 3"/>
+          <p:cNvSpPr>
+            <a:spLocks noGrp="1" noRot="1" noChangeAspect="1"/>
+          </p:cNvSpPr>
+          <p:nvPr>
+            <p:ph type="sldImg" idx="2"/>
+          </p:nvPr>
+        </p:nvSpPr>
+        <p:spPr>
+          <a:xfrm>
+            <a:off x="685800" y="1143000"/>
+            <a:ext cx="5486400" cy="3086100"/>
+          </a:xfrm>
+          <a:prstGeom prst="rect">
+            <a:avLst/>
+          </a:prstGeom>
+          <a:noFill/>
+          <a:ln w="12700">
+            <a:solidFill>
+              <a:prstClr val="black"/>
+            </a:solidFill>
+          </a:ln>
+        </p:spPr>
+        <p:txBody>
+          <a:bodyPr vert="horz" lIns="91440" tIns="45720" rIns="91440" bIns="45720" rtlCol="0" anchor="ctr"/>
+          <a:lstStyle/>
+          <a:p>
+            <a:endParaRPr lang="en-US"/>
+          </a:p>
+        </p:txBody>
+      </p:sp>
+      <p:sp>
+        <p:nvSpPr>
+          <p:cNvPr id="5" name="Notes Placeholder 4"/>
+          <p:cNvSpPr>
+            <a:spLocks noGrp="1"/>
+          </p:cNvSpPr>
+          <p:nvPr>
+            <p:ph type="body" sz="quarter" idx="3"/>
+          </p:nvPr>
+        </p:nvSpPr>
+        <p:spPr>
+          <a:xfrm>
+            <a:off x="685800" y="4400550"/>
+            <a:ext cx="5486400" cy="3600450"/>
+          </a:xfrm>
+          <a:prstGeom prst="rect">
+            <a:avLst/>
+          </a:prstGeom>
+        </p:spPr>
+        <p:txBody>
+          <a:bodyPr vert="horz" lIns="91440" tIns="45720" rIns="91440" bIns="45720" rtlCol="0"/>
+          <a:lstStyle/>
+          <a:p>
+            <a:pPr lvl="0"/>
+            <a:r>
+              <a:rPr lang="en-US"/>
+              <a:t>Edit Master text styles</a:t>
+            </a:r>
+          </a:p>
+          <a:p>
+            <a:pPr lvl="1"/>
+            <a:r>
+              <a:rPr lang="en-US"/>
+              <a:t>Second level</a:t>
+            </a:r>
+          </a:p>
+          <a:p>
+            <a:pPr lvl="2"/>
+            <a:r>
+              <a:rPr lang="en-US"/>
+              <a:t>Third level</a:t>
+            </a:r>
+          </a:p>
+          <a:p>
+            <a:pPr lvl="3"/>
+            <a:r>
+              <a:rPr lang="en-US"/>
+              <a:t>Fourth level</a:t>
+            </a:r>
+          </a:p>
+          <a:p>
+            <a:pPr lvl="4"/>
+            <a:r>
+              <a:rPr lang="en-US"/>
+              <a:t>Fifth level</a:t>
+            </a:r>
+          </a:p>
+        </p:txBody>
+      </p:sp>
+      <p:sp>
+        <p:nvSpPr>
+          <p:cNvPr id="6" name="Footer Placeholder 5"/>
+          <p:cNvSpPr>
+            <a:spLocks noGrp="1"/>
+          </p:cNvSpPr>
+          <p:nvPr>
+            <p:ph type="ftr" sz="quarter" idx="4"/>
+          </p:nvPr>
+        </p:nvSpPr>
+        <p:spPr>
+          <a:xfrm>
+            <a:off x="0" y="8685213"/>
+            <a:ext cx="2971800" cy="458787"/>
+          </a:xfrm>
+          <a:prstGeom prst="rect">
+            <a:avLst/>
+          </a:prstGeom>
+        </p:spPr>
+        <p:txBody>
+          <a:bodyPr vert="horz" lIns="91440" tIns="45720" rIns="91440" bIns="45720" rtlCol="0" anchor="b"/>
+          <a:lstStyle>
+            <a:lvl1pPr algn="l">
+              <a:defRPr sz="1200"/>
+            </a:lvl1pPr>
+          </a:lstStyle>
+          <a:p>
+            <a:endParaRPr lang="en-US"/>
+          </a:p>
+        </p:txBody>
+      </p:sp>
+      <p:sp>
+        <p:nvSpPr>
+          <p:cNvPr id="7" name="Slide Number Placeholder 6"/>
+          <p:cNvSpPr>
+            <a:spLocks noGrp="1"/>
+          </p:cNvSpPr>
+          <p:nvPr>
+            <p:ph type="sldNum" sz="quarter" idx="5"/>
+          </p:nvPr>
+        </p:nvSpPr>
+        <p:spPr>
+          <a:xfrm>
+            <a:off x="3884613" y="8685213"/>
+            <a:ext cx="2971800" cy="458787"/>
+          </a:xfrm>
+          <a:prstGeom prst="rect">
+            <a:avLst/>
+          </a:prstGeom>
+        </p:spPr>
+        <p:txBody>
+          <a:bodyPr vert="horz" lIns="91440" tIns="45720" rIns="91440" bIns="45720" rtlCol="0" anchor="b"/>
+          <a:lstStyle>
+            <a:lvl1pPr algn="r">
+              <a:defRPr sz="1200"/>
+            </a:lvl1pPr>
+          </a:lstStyle>
+          <a:p>
+            <a:fld id="{E06DF3DB-6D47-1F43-A449-839840CEEE50}" type="slidenum">
+              <a:rPr lang="en-US" smtClean="0"/>
+              <a:t>‹#›</a:t>
+            </a:fld>
+            <a:endParaRPr lang="en-US"/>
+          </a:p>
+        </p:txBody>
+      </p:sp>
+    </p:spTree>
+    <p:extLst>
+      <p:ext uri="{BB962C8B-B14F-4D97-AF65-F5344CB8AC3E}">
+        <p14:creationId xmlns:p14="http://schemas.microsoft.com/office/powerpoint/2010/main" val="1429326029"/>
+      </p:ext>
+    </p:extLst>
+  </p:cSld>
+  <p:clrMap bg1="lt1" tx1="dk1" bg2="lt2" tx2="dk2" accent1="accent1" accent2="accent2" accent3="accent3" accent4="accent4" accent5="accent5" accent6="accent6" hlink="hlink" folHlink="folHlink"/>
+  <p:notesStyle>
+    <a:lvl1pPr marL="0" algn="l" defTabSz="914400" rtl="0" eaLnBrk="1" latinLnBrk="0" hangingPunct="1">
+      <a:defRPr sz="1200" kern="1200">
+        <a:solidFill>
+          <a:schemeClr val="tx1"/>
+        </a:solidFill>
+        <a:latin typeface="+mn-lt"/>
+        <a:ea typeface="+mn-ea"/>
+        <a:cs typeface="+mn-cs"/>
+      </a:defRPr>
+    </a:lvl1pPr>
+    <a:lvl2pPr marL="457200" algn="l" defTabSz="914400" rtl="0" eaLnBrk="1" latinLnBrk="0" hangingPunct="1">
+      <a:defRPr sz="1200" kern="1200">
+        <a:solidFill>
+          <a:schemeClr val="tx1"/>
+        </a:solidFill>
+        <a:latin typeface="+mn-lt"/>
+        <a:ea typeface="+mn-ea"/>
+        <a:cs typeface="+mn-cs"/>
+      </a:defRPr>
+    </a:lvl2pPr>
+    <a:lvl3pPr marL="914400" algn="l" defTabSz="914400" rtl="0" eaLnBrk="1" latinLnBrk="0" hangingPunct="1">
+      <a:defRPr sz="1200" kern="1200">
+        <a:solidFill>
+          <a:schemeClr val="tx1"/>
+        </a:solidFill>
+        <a:latin typeface="+mn-lt"/>
+        <a:ea typeface="+mn-ea"/>
+        <a:cs typeface="+mn-cs"/>
+      </a:defRPr>
+    </a:lvl3pPr>
+    <a:lvl4pPr marL="1371600" algn="l" defTabSz="914400" rtl="0" eaLnBrk="1" latinLnBrk="0" hangingPunct="1">
+      <a:defRPr sz="1200" kern="1200">
+        <a:solidFill>
+          <a:schemeClr val="tx1"/>
+        </a:solidFill>
+        <a:latin typeface="+mn-lt"/>
+        <a:ea typeface="+mn-ea"/>
+        <a:cs typeface="+mn-cs"/>
+      </a:defRPr>
+    </a:lvl4pPr>
+    <a:lvl5pPr marL="1828800" algn="l" defTabSz="914400" rtl="0" eaLnBrk="1" latinLnBrk="0" hangingPunct="1">
+      <a:defRPr sz="1200" kern="1200">
+        <a:solidFill>
+          <a:schemeClr val="tx1"/>
+        </a:solidFill>
+        <a:latin typeface="+mn-lt"/>
+        <a:ea typeface="+mn-ea"/>
+        <a:cs typeface="+mn-cs"/>
+      </a:defRPr>
+    </a:lvl5pPr>
+    <a:lvl6pPr marL="2286000" algn="l" defTabSz="914400" rtl="0" eaLnBrk="1" latinLnBrk="0" hangingPunct="1">
+      <a:defRPr sz="1200" kern="1200">
+        <a:solidFill>
+          <a:schemeClr val="tx1"/>
+        </a:solidFill>
+        <a:latin typeface="+mn-lt"/>
+        <a:ea typeface="+mn-ea"/>
+        <a:cs typeface="+mn-cs"/>
+      </a:defRPr>
+    </a:lvl6pPr>
+    <a:lvl7pPr marL="2743200" algn="l" defTabSz="914400" rtl="0" eaLnBrk="1" latinLnBrk="0" hangingPunct="1">
+      <a:defRPr sz="1200" kern="1200">
+        <a:solidFill>
+          <a:schemeClr val="tx1"/>
+        </a:solidFill>
+        <a:latin typeface="+mn-lt"/>
+        <a:ea typeface="+mn-ea"/>
+        <a:cs typeface="+mn-cs"/>
+      </a:defRPr>
+    </a:lvl7pPr>
+    <a:lvl8pPr marL="3200400" algn="l" defTabSz="914400" rtl="0" eaLnBrk="1" latinLnBrk="0" hangingPunct="1">
+      <a:defRPr sz="1200" kern="1200">
+        <a:solidFill>
+          <a:schemeClr val="tx1"/>
+        </a:solidFill>
+        <a:latin typeface="+mn-lt"/>
+        <a:ea typeface="+mn-ea"/>
+        <a:cs typeface="+mn-cs"/>
+      </a:defRPr>
+    </a:lvl8pPr>
+    <a:lvl9pPr marL="3657600" algn="l" defTabSz="914400" rtl="0" eaLnBrk="1" latinLnBrk="0" hangingPunct="1">
+      <a:defRPr sz="1200" kern="1200">
+        <a:solidFill>
+          <a:schemeClr val="tx1"/>
+        </a:solidFill>
+        <a:latin typeface="+mn-lt"/>
+        <a:ea typeface="+mn-ea"/>
+        <a:cs typeface="+mn-cs"/>
+      </a:defRPr>
+    </a:lvl9pPr>
+  </p:notesStyle>
+</p:notesMaster>
+</file>
+
+<file path=ppt/notesSlides/notesSlide1.xml><?xml version="1.0" encoding="utf-8"?>
+<p:notes xmlns:a="http://schemas.openxmlformats.org/drawingml/2006/main" xmlns:r="http://schemas.openxmlformats.org/officeDocument/2006/relationships" xmlns:p="http://schemas.openxmlformats.org/presentationml/2006/main">
+  <p:cSld>
+    <p:spTree>
+      <p:nvGrpSpPr>
+        <p:cNvPr id="1" name=""/>
+        <p:cNvGrpSpPr/>
+        <p:nvPr/>
+      </p:nvGrpSpPr>
+      <p:grpSpPr>
+        <a:xfrm>
+          <a:off x="0" y="0"/>
+          <a:ext cx="0" cy="0"/>
+          <a:chOff x="0" y="0"/>
+          <a:chExt cx="0" cy="0"/>
+        </a:xfrm>
+      </p:grpSpPr>
+      <p:sp>
+        <p:nvSpPr>
+          <p:cNvPr id="2" name="Slide Image Placeholder 1"/>
+          <p:cNvSpPr>
+            <a:spLocks noGrp="1" noRot="1" noChangeAspect="1"/>
+          </p:cNvSpPr>
+          <p:nvPr>
+            <p:ph type="sldImg"/>
+          </p:nvPr>
+        </p:nvSpPr>
+        <p:spPr/>
+      </p:sp>
+      <p:sp>
+        <p:nvSpPr>
+          <p:cNvPr id="3" name="Notes Placeholder 2"/>
+          <p:cNvSpPr>
+            <a:spLocks noGrp="1"/>
+          </p:cNvSpPr>
+          <p:nvPr>
+            <p:ph type="body" idx="1"/>
+          </p:nvPr>
+        </p:nvSpPr>
+        <p:spPr/>
+        <p:txBody>
+          <a:bodyPr/>
+          <a:lstStyle/>
+          <a:p>
+            <a:endParaRPr lang="en-US" dirty="0"/>
+          </a:p>
+        </p:txBody>
+      </p:sp>
+      <p:sp>
+        <p:nvSpPr>
+          <p:cNvPr id="4" name="Slide Number Placeholder 3"/>
+          <p:cNvSpPr>
+            <a:spLocks noGrp="1"/>
+          </p:cNvSpPr>
+          <p:nvPr>
+            <p:ph type="sldNum" sz="quarter" idx="5"/>
+          </p:nvPr>
+        </p:nvSpPr>
+        <p:spPr/>
+        <p:txBody>
+          <a:bodyPr/>
+          <a:lstStyle/>
+          <a:p>
+            <a:fld id="{E06DF3DB-6D47-1F43-A449-839840CEEE50}" type="slidenum">
+              <a:rPr lang="en-US" smtClean="0"/>
+              <a:t>10</a:t>
+            </a:fld>
+            <a:endParaRPr lang="en-US"/>
+          </a:p>
+        </p:txBody>
+      </p:sp>
+    </p:spTree>
+    <p:extLst>
+      <p:ext uri="{BB962C8B-B14F-4D97-AF65-F5344CB8AC3E}">
+        <p14:creationId xmlns:p14="http://schemas.microsoft.com/office/powerpoint/2010/main" val="1347620125"/>
+      </p:ext>
+    </p:extLst>
+  </p:cSld>
+  <p:clrMapOvr>
+    <a:masterClrMapping/>
+  </p:clrMapOvr>
+</p:notes>
+</file>
+
+<file path=ppt/notesSlides/notesSlide2.xml><?xml version="1.0" encoding="utf-8"?>
+<p:notes xmlns:a="http://schemas.openxmlformats.org/drawingml/2006/main" xmlns:r="http://schemas.openxmlformats.org/officeDocument/2006/relationships" xmlns:p="http://schemas.openxmlformats.org/presentationml/2006/main">
+  <p:cSld>
+    <p:spTree>
+      <p:nvGrpSpPr>
+        <p:cNvPr id="1" name=""/>
+        <p:cNvGrpSpPr/>
+        <p:nvPr/>
+      </p:nvGrpSpPr>
+      <p:grpSpPr>
+        <a:xfrm>
+          <a:off x="0" y="0"/>
+          <a:ext cx="0" cy="0"/>
+          <a:chOff x="0" y="0"/>
+          <a:chExt cx="0" cy="0"/>
+        </a:xfrm>
+      </p:grpSpPr>
+      <p:sp>
+        <p:nvSpPr>
+          <p:cNvPr id="2" name="Slide Image Placeholder 1"/>
+          <p:cNvSpPr>
+            <a:spLocks noGrp="1" noRot="1" noChangeAspect="1"/>
+          </p:cNvSpPr>
+          <p:nvPr>
+            <p:ph type="sldImg"/>
+          </p:nvPr>
+        </p:nvSpPr>
+        <p:spPr/>
+      </p:sp>
+      <p:sp>
+        <p:nvSpPr>
+          <p:cNvPr id="3" name="Notes Placeholder 2"/>
+          <p:cNvSpPr>
+            <a:spLocks noGrp="1"/>
+          </p:cNvSpPr>
+          <p:nvPr>
+            <p:ph type="body" idx="1"/>
+          </p:nvPr>
+        </p:nvSpPr>
+        <p:spPr/>
+        <p:txBody>
+          <a:bodyPr/>
+          <a:lstStyle/>
+          <a:p>
+            <a:endParaRPr lang="en-US" dirty="0"/>
+          </a:p>
+        </p:txBody>
+      </p:sp>
+      <p:sp>
+        <p:nvSpPr>
+          <p:cNvPr id="4" name="Slide Number Placeholder 3"/>
+          <p:cNvSpPr>
+            <a:spLocks noGrp="1"/>
+          </p:cNvSpPr>
+          <p:nvPr>
+            <p:ph type="sldNum" sz="quarter" idx="5"/>
+          </p:nvPr>
+        </p:nvSpPr>
+        <p:spPr/>
+        <p:txBody>
+          <a:bodyPr/>
+          <a:lstStyle/>
+          <a:p>
+            <a:fld id="{E06DF3DB-6D47-1F43-A449-839840CEEE50}" type="slidenum">
+              <a:rPr lang="en-US" smtClean="0"/>
+              <a:t>11</a:t>
+            </a:fld>
+            <a:endParaRPr lang="en-US"/>
+          </a:p>
+        </p:txBody>
+      </p:sp>
+    </p:spTree>
+    <p:extLst>
+      <p:ext uri="{BB962C8B-B14F-4D97-AF65-F5344CB8AC3E}">
+        <p14:creationId xmlns:p14="http://schemas.microsoft.com/office/powerpoint/2010/main" val="3045507122"/>
+      </p:ext>
+    </p:extLst>
+  </p:cSld>
+  <p:clrMapOvr>
+    <a:masterClrMapping/>
+  </p:clrMapOvr>
+</p:notes>
 </file>
 
 <file path=ppt/slideLayouts/slideLayout1.xml><?xml version="1.0" encoding="utf-8"?>
@@ -3450,6 +3975,2821 @@
 </p:sld>
 </file>
 
+<file path=ppt/slides/slide10.xml><?xml version="1.0" encoding="utf-8"?>
+<p:sld xmlns:a="http://schemas.openxmlformats.org/drawingml/2006/main" xmlns:r="http://schemas.openxmlformats.org/officeDocument/2006/relationships" xmlns:p="http://schemas.openxmlformats.org/presentationml/2006/main">
+  <p:cSld>
+    <p:spTree>
+      <p:nvGrpSpPr>
+        <p:cNvPr id="1" name=""/>
+        <p:cNvGrpSpPr/>
+        <p:nvPr/>
+      </p:nvGrpSpPr>
+      <p:grpSpPr>
+        <a:xfrm>
+          <a:off x="0" y="0"/>
+          <a:ext cx="0" cy="0"/>
+          <a:chOff x="0" y="0"/>
+          <a:chExt cx="0" cy="0"/>
+        </a:xfrm>
+      </p:grpSpPr>
+      <p:sp>
+        <p:nvSpPr>
+          <p:cNvPr id="3" name="Content Placeholder 2">
+            <a:extLst>
+              <a:ext uri="{FF2B5EF4-FFF2-40B4-BE49-F238E27FC236}">
+                <a16:creationId xmlns:a16="http://schemas.microsoft.com/office/drawing/2014/main" id="{8065CE91-9491-9143-A1E4-2BA3F3AA7BDA}"/>
+              </a:ext>
+            </a:extLst>
+          </p:cNvPr>
+          <p:cNvSpPr>
+            <a:spLocks noGrp="1"/>
+          </p:cNvSpPr>
+          <p:nvPr>
+            <p:ph idx="1"/>
+          </p:nvPr>
+        </p:nvSpPr>
+        <p:spPr>
+          <a:xfrm>
+            <a:off x="838200" y="1825625"/>
+            <a:ext cx="10515600" cy="4240878"/>
+          </a:xfrm>
+        </p:spPr>
+        <p:txBody>
+          <a:bodyPr>
+            <a:normAutofit/>
+          </a:bodyPr>
+          <a:lstStyle/>
+          <a:p>
+            <a:r>
+              <a:rPr lang="en-US" dirty="0"/>
+              <a:t>When operator()(2,1) is called on the orange</a:t>
+            </a:r>
+            <a:br>
+              <a:rPr lang="en-US" dirty="0"/>
+            </a:br>
+            <a:r>
+              <a:rPr lang="en-US" dirty="0"/>
+              <a:t>rank:</a:t>
+            </a:r>
+          </a:p>
+          <a:p>
+            <a:pPr lvl="1"/>
+            <a:r>
+              <a:rPr lang="en-US" sz="2000" dirty="0"/>
+              <a:t>a promise&lt;Tile&gt; “2,1 p” is created</a:t>
+            </a:r>
+          </a:p>
+          <a:p>
+            <a:pPr lvl="1"/>
+            <a:r>
+              <a:rPr lang="en-US" sz="2000" dirty="0"/>
+              <a:t>the future&lt;Tile&gt; is replaced</a:t>
+            </a:r>
+            <a:br>
+              <a:rPr lang="en-US" sz="2000" dirty="0"/>
+            </a:br>
+            <a:r>
+              <a:rPr lang="en-US" sz="2000" dirty="0"/>
+              <a:t>by the future of the promise “2,1 n”</a:t>
+            </a:r>
+            <a:br>
+              <a:rPr lang="en-US" sz="2000" dirty="0"/>
+            </a:br>
+            <a:endParaRPr lang="en-US" sz="2000" dirty="0"/>
+          </a:p>
+          <a:p>
+            <a:pPr lvl="1"/>
+            <a:r>
+              <a:rPr lang="en-US" sz="2000" dirty="0"/>
+              <a:t>a future&lt;Wrapper&lt;Tile&gt;&gt; is created</a:t>
+            </a:r>
+            <a:br>
+              <a:rPr lang="en-US" sz="2000" dirty="0"/>
+            </a:br>
+            <a:r>
+              <a:rPr lang="en-US" sz="2000" dirty="0"/>
+              <a:t>from the “old” future&lt;Tile&gt; and returned.</a:t>
+            </a:r>
+            <a:br>
+              <a:rPr lang="en-US" sz="2000" dirty="0"/>
+            </a:br>
+            <a:r>
+              <a:rPr lang="en-US" sz="2000" dirty="0"/>
+              <a:t>(a synchronous .then is used, therefore the task is executed immediately if the future&lt;Tile&gt; is ready, otherwise the task is executed immediately after the “old” future&lt;Tile&gt; gets ready.</a:t>
+            </a:r>
+            <a:br>
+              <a:rPr lang="en-US" sz="2000" dirty="0"/>
+            </a:br>
+            <a:endParaRPr lang="en-US" sz="2000" dirty="0"/>
+          </a:p>
+          <a:p>
+            <a:pPr lvl="1"/>
+            <a:r>
+              <a:rPr lang="en-US" sz="2000" dirty="0"/>
+              <a:t>After the task that modify the Tile 2,1 is finished, the destructor of Wrapper&lt;Tile&gt; is called. It sets the value of “2,1 p” moving the modified Tile. </a:t>
+            </a:r>
+          </a:p>
+        </p:txBody>
+      </p:sp>
+      <p:sp>
+        <p:nvSpPr>
+          <p:cNvPr id="38" name="Rectangle 37">
+            <a:extLst>
+              <a:ext uri="{FF2B5EF4-FFF2-40B4-BE49-F238E27FC236}">
+                <a16:creationId xmlns:a16="http://schemas.microsoft.com/office/drawing/2014/main" id="{2ECCCAE9-F67B-2142-BFE0-F99ADDD1A6CB}"/>
+              </a:ext>
+            </a:extLst>
+          </p:cNvPr>
+          <p:cNvSpPr/>
+          <p:nvPr/>
+        </p:nvSpPr>
+        <p:spPr>
+          <a:xfrm>
+            <a:off x="8996516" y="3482753"/>
+            <a:ext cx="1524000" cy="648929"/>
+          </a:xfrm>
+          <a:prstGeom prst="rect">
+            <a:avLst/>
+          </a:prstGeom>
+        </p:spPr>
+        <p:style>
+          <a:lnRef idx="2">
+            <a:schemeClr val="accent3">
+              <a:shade val="50000"/>
+            </a:schemeClr>
+          </a:lnRef>
+          <a:fillRef idx="1">
+            <a:schemeClr val="accent3"/>
+          </a:fillRef>
+          <a:effectRef idx="0">
+            <a:schemeClr val="accent3"/>
+          </a:effectRef>
+          <a:fontRef idx="minor">
+            <a:schemeClr val="lt1"/>
+          </a:fontRef>
+        </p:style>
+        <p:txBody>
+          <a:bodyPr rtlCol="0" anchor="ctr"/>
+          <a:lstStyle/>
+          <a:p>
+            <a:pPr algn="ctr"/>
+            <a:endParaRPr lang="en-US"/>
+          </a:p>
+        </p:txBody>
+      </p:sp>
+      <p:sp>
+        <p:nvSpPr>
+          <p:cNvPr id="2" name="Title 1">
+            <a:extLst>
+              <a:ext uri="{FF2B5EF4-FFF2-40B4-BE49-F238E27FC236}">
+                <a16:creationId xmlns:a16="http://schemas.microsoft.com/office/drawing/2014/main" id="{CE0F46F3-BC9F-5644-AD8F-0CC76BAA1902}"/>
+              </a:ext>
+            </a:extLst>
+          </p:cNvPr>
+          <p:cNvSpPr>
+            <a:spLocks noGrp="1"/>
+          </p:cNvSpPr>
+          <p:nvPr>
+            <p:ph type="title"/>
+          </p:nvPr>
+        </p:nvSpPr>
+        <p:spPr>
+          <a:xfrm>
+            <a:off x="838200" y="365125"/>
+            <a:ext cx="10515600" cy="1325563"/>
+          </a:xfrm>
+        </p:spPr>
+        <p:txBody>
+          <a:bodyPr/>
+          <a:lstStyle/>
+          <a:p>
+            <a:r>
+              <a:rPr lang="en-US" dirty="0"/>
+              <a:t>Example operator() orange rank:</a:t>
+            </a:r>
+          </a:p>
+        </p:txBody>
+      </p:sp>
+      <p:sp>
+        <p:nvSpPr>
+          <p:cNvPr id="5" name="Rectangle 4">
+            <a:extLst>
+              <a:ext uri="{FF2B5EF4-FFF2-40B4-BE49-F238E27FC236}">
+                <a16:creationId xmlns:a16="http://schemas.microsoft.com/office/drawing/2014/main" id="{3B54EB16-7A5B-8A43-9817-9997554CD933}"/>
+              </a:ext>
+            </a:extLst>
+          </p:cNvPr>
+          <p:cNvSpPr/>
+          <p:nvPr/>
+        </p:nvSpPr>
+        <p:spPr>
+          <a:xfrm>
+            <a:off x="8889289" y="1837392"/>
+            <a:ext cx="651286" cy="473342"/>
+          </a:xfrm>
+          <a:prstGeom prst="rect">
+            <a:avLst/>
+          </a:prstGeom>
+        </p:spPr>
+        <p:style>
+          <a:lnRef idx="2">
+            <a:schemeClr val="accent2">
+              <a:shade val="50000"/>
+            </a:schemeClr>
+          </a:lnRef>
+          <a:fillRef idx="1">
+            <a:schemeClr val="accent2"/>
+          </a:fillRef>
+          <a:effectRef idx="0">
+            <a:schemeClr val="accent2"/>
+          </a:effectRef>
+          <a:fontRef idx="minor">
+            <a:schemeClr val="lt1"/>
+          </a:fontRef>
+        </p:style>
+        <p:txBody>
+          <a:bodyPr rtlCol="0" anchor="ctr"/>
+          <a:lstStyle/>
+          <a:p>
+            <a:pPr algn="ctr"/>
+            <a:r>
+              <a:rPr lang="en-US" dirty="0"/>
+              <a:t>0,1</a:t>
+            </a:r>
+          </a:p>
+        </p:txBody>
+      </p:sp>
+      <p:sp>
+        <p:nvSpPr>
+          <p:cNvPr id="10" name="Rectangle 9">
+            <a:extLst>
+              <a:ext uri="{FF2B5EF4-FFF2-40B4-BE49-F238E27FC236}">
+                <a16:creationId xmlns:a16="http://schemas.microsoft.com/office/drawing/2014/main" id="{F9613E89-3C6D-834E-A737-1A05FB110829}"/>
+              </a:ext>
+            </a:extLst>
+          </p:cNvPr>
+          <p:cNvSpPr/>
+          <p:nvPr/>
+        </p:nvSpPr>
+        <p:spPr>
+          <a:xfrm>
+            <a:off x="9643783" y="1825625"/>
+            <a:ext cx="651286" cy="473342"/>
+          </a:xfrm>
+          <a:prstGeom prst="rect">
+            <a:avLst/>
+          </a:prstGeom>
+        </p:spPr>
+        <p:style>
+          <a:lnRef idx="2">
+            <a:schemeClr val="accent2">
+              <a:shade val="50000"/>
+            </a:schemeClr>
+          </a:lnRef>
+          <a:fillRef idx="1">
+            <a:schemeClr val="accent2"/>
+          </a:fillRef>
+          <a:effectRef idx="0">
+            <a:schemeClr val="accent2"/>
+          </a:effectRef>
+          <a:fontRef idx="minor">
+            <a:schemeClr val="lt1"/>
+          </a:fontRef>
+        </p:style>
+        <p:txBody>
+          <a:bodyPr rtlCol="0" anchor="ctr"/>
+          <a:lstStyle/>
+          <a:p>
+            <a:pPr algn="ctr"/>
+            <a:r>
+              <a:rPr lang="en-US" dirty="0"/>
+              <a:t>2,1</a:t>
+            </a:r>
+          </a:p>
+        </p:txBody>
+      </p:sp>
+      <p:sp>
+        <p:nvSpPr>
+          <p:cNvPr id="14" name="Rectangle 13">
+            <a:extLst>
+              <a:ext uri="{FF2B5EF4-FFF2-40B4-BE49-F238E27FC236}">
+                <a16:creationId xmlns:a16="http://schemas.microsoft.com/office/drawing/2014/main" id="{8377B2CB-A14F-7647-90C7-D2F4420145D2}"/>
+              </a:ext>
+            </a:extLst>
+          </p:cNvPr>
+          <p:cNvSpPr/>
+          <p:nvPr/>
+        </p:nvSpPr>
+        <p:spPr>
+          <a:xfrm>
+            <a:off x="10376870" y="1825625"/>
+            <a:ext cx="651286" cy="473342"/>
+          </a:xfrm>
+          <a:prstGeom prst="rect">
+            <a:avLst/>
+          </a:prstGeom>
+        </p:spPr>
+        <p:style>
+          <a:lnRef idx="2">
+            <a:schemeClr val="accent2">
+              <a:shade val="50000"/>
+            </a:schemeClr>
+          </a:lnRef>
+          <a:fillRef idx="1">
+            <a:schemeClr val="accent2"/>
+          </a:fillRef>
+          <a:effectRef idx="0">
+            <a:schemeClr val="accent2"/>
+          </a:effectRef>
+          <a:fontRef idx="minor">
+            <a:schemeClr val="lt1"/>
+          </a:fontRef>
+        </p:style>
+        <p:txBody>
+          <a:bodyPr rtlCol="0" anchor="ctr"/>
+          <a:lstStyle/>
+          <a:p>
+            <a:pPr algn="ctr"/>
+            <a:r>
+              <a:rPr lang="en-US" dirty="0"/>
+              <a:t>0,3</a:t>
+            </a:r>
+          </a:p>
+        </p:txBody>
+      </p:sp>
+      <p:sp>
+        <p:nvSpPr>
+          <p:cNvPr id="18" name="Rectangle 17">
+            <a:extLst>
+              <a:ext uri="{FF2B5EF4-FFF2-40B4-BE49-F238E27FC236}">
+                <a16:creationId xmlns:a16="http://schemas.microsoft.com/office/drawing/2014/main" id="{14DA06FB-82C0-B24B-858E-FC6EDBA48007}"/>
+              </a:ext>
+            </a:extLst>
+          </p:cNvPr>
+          <p:cNvSpPr/>
+          <p:nvPr/>
+        </p:nvSpPr>
+        <p:spPr>
+          <a:xfrm>
+            <a:off x="11109957" y="1825625"/>
+            <a:ext cx="651286" cy="473342"/>
+          </a:xfrm>
+          <a:prstGeom prst="rect">
+            <a:avLst/>
+          </a:prstGeom>
+        </p:spPr>
+        <p:style>
+          <a:lnRef idx="2">
+            <a:schemeClr val="accent2">
+              <a:shade val="50000"/>
+            </a:schemeClr>
+          </a:lnRef>
+          <a:fillRef idx="1">
+            <a:schemeClr val="accent2"/>
+          </a:fillRef>
+          <a:effectRef idx="0">
+            <a:schemeClr val="accent2"/>
+          </a:effectRef>
+          <a:fontRef idx="minor">
+            <a:schemeClr val="lt1"/>
+          </a:fontRef>
+        </p:style>
+        <p:txBody>
+          <a:bodyPr rtlCol="0" anchor="ctr"/>
+          <a:lstStyle/>
+          <a:p>
+            <a:pPr algn="ctr"/>
+            <a:r>
+              <a:rPr lang="en-US" dirty="0"/>
+              <a:t>2,3</a:t>
+            </a:r>
+          </a:p>
+        </p:txBody>
+      </p:sp>
+      <p:sp>
+        <p:nvSpPr>
+          <p:cNvPr id="25" name="Rectangle 24">
+            <a:extLst>
+              <a:ext uri="{FF2B5EF4-FFF2-40B4-BE49-F238E27FC236}">
+                <a16:creationId xmlns:a16="http://schemas.microsoft.com/office/drawing/2014/main" id="{96E9BA96-A704-5A46-981D-5FB6B3A42990}"/>
+              </a:ext>
+            </a:extLst>
+          </p:cNvPr>
+          <p:cNvSpPr/>
+          <p:nvPr/>
+        </p:nvSpPr>
+        <p:spPr>
+          <a:xfrm>
+            <a:off x="8889289" y="2874474"/>
+            <a:ext cx="651286" cy="473342"/>
+          </a:xfrm>
+          <a:prstGeom prst="rect">
+            <a:avLst/>
+          </a:prstGeom>
+        </p:spPr>
+        <p:style>
+          <a:lnRef idx="2">
+            <a:schemeClr val="accent2">
+              <a:shade val="50000"/>
+            </a:schemeClr>
+          </a:lnRef>
+          <a:fillRef idx="1">
+            <a:schemeClr val="accent2"/>
+          </a:fillRef>
+          <a:effectRef idx="0">
+            <a:schemeClr val="accent2"/>
+          </a:effectRef>
+          <a:fontRef idx="minor">
+            <a:schemeClr val="lt1"/>
+          </a:fontRef>
+        </p:style>
+        <p:txBody>
+          <a:bodyPr rtlCol="0" anchor="ctr"/>
+          <a:lstStyle/>
+          <a:p>
+            <a:pPr algn="ctr"/>
+            <a:r>
+              <a:rPr lang="en-US" dirty="0"/>
+              <a:t>0,1</a:t>
+            </a:r>
+          </a:p>
+        </p:txBody>
+      </p:sp>
+      <p:sp>
+        <p:nvSpPr>
+          <p:cNvPr id="26" name="Rectangle 25">
+            <a:extLst>
+              <a:ext uri="{FF2B5EF4-FFF2-40B4-BE49-F238E27FC236}">
+                <a16:creationId xmlns:a16="http://schemas.microsoft.com/office/drawing/2014/main" id="{6F7FF820-0492-8C4D-9818-CE60A1FD1237}"/>
+              </a:ext>
+            </a:extLst>
+          </p:cNvPr>
+          <p:cNvSpPr/>
+          <p:nvPr/>
+        </p:nvSpPr>
+        <p:spPr>
+          <a:xfrm>
+            <a:off x="9643783" y="2862707"/>
+            <a:ext cx="651286" cy="473342"/>
+          </a:xfrm>
+          <a:prstGeom prst="rect">
+            <a:avLst/>
+          </a:prstGeom>
+        </p:spPr>
+        <p:style>
+          <a:lnRef idx="1">
+            <a:schemeClr val="accent2"/>
+          </a:lnRef>
+          <a:fillRef idx="2">
+            <a:schemeClr val="accent2"/>
+          </a:fillRef>
+          <a:effectRef idx="1">
+            <a:schemeClr val="accent2"/>
+          </a:effectRef>
+          <a:fontRef idx="minor">
+            <a:schemeClr val="dk1"/>
+          </a:fontRef>
+        </p:style>
+        <p:txBody>
+          <a:bodyPr rtlCol="0" anchor="ctr"/>
+          <a:lstStyle/>
+          <a:p>
+            <a:pPr algn="ctr"/>
+            <a:r>
+              <a:rPr lang="en-US" dirty="0"/>
+              <a:t>2,1 n</a:t>
+            </a:r>
+          </a:p>
+        </p:txBody>
+      </p:sp>
+      <p:sp>
+        <p:nvSpPr>
+          <p:cNvPr id="27" name="Rectangle 26">
+            <a:extLst>
+              <a:ext uri="{FF2B5EF4-FFF2-40B4-BE49-F238E27FC236}">
+                <a16:creationId xmlns:a16="http://schemas.microsoft.com/office/drawing/2014/main" id="{286DEF19-F25E-7E4B-95BB-345ECCB5D2EA}"/>
+              </a:ext>
+            </a:extLst>
+          </p:cNvPr>
+          <p:cNvSpPr/>
+          <p:nvPr/>
+        </p:nvSpPr>
+        <p:spPr>
+          <a:xfrm>
+            <a:off x="10376870" y="2862707"/>
+            <a:ext cx="651286" cy="473342"/>
+          </a:xfrm>
+          <a:prstGeom prst="rect">
+            <a:avLst/>
+          </a:prstGeom>
+        </p:spPr>
+        <p:style>
+          <a:lnRef idx="2">
+            <a:schemeClr val="accent2">
+              <a:shade val="50000"/>
+            </a:schemeClr>
+          </a:lnRef>
+          <a:fillRef idx="1">
+            <a:schemeClr val="accent2"/>
+          </a:fillRef>
+          <a:effectRef idx="0">
+            <a:schemeClr val="accent2"/>
+          </a:effectRef>
+          <a:fontRef idx="minor">
+            <a:schemeClr val="lt1"/>
+          </a:fontRef>
+        </p:style>
+        <p:txBody>
+          <a:bodyPr rtlCol="0" anchor="ctr"/>
+          <a:lstStyle/>
+          <a:p>
+            <a:pPr algn="ctr"/>
+            <a:r>
+              <a:rPr lang="en-US" dirty="0"/>
+              <a:t>0,3</a:t>
+            </a:r>
+          </a:p>
+        </p:txBody>
+      </p:sp>
+      <p:sp>
+        <p:nvSpPr>
+          <p:cNvPr id="28" name="Rectangle 27">
+            <a:extLst>
+              <a:ext uri="{FF2B5EF4-FFF2-40B4-BE49-F238E27FC236}">
+                <a16:creationId xmlns:a16="http://schemas.microsoft.com/office/drawing/2014/main" id="{AD4080A3-F76A-5A47-9A36-5D01637C5BDF}"/>
+              </a:ext>
+            </a:extLst>
+          </p:cNvPr>
+          <p:cNvSpPr/>
+          <p:nvPr/>
+        </p:nvSpPr>
+        <p:spPr>
+          <a:xfrm>
+            <a:off x="11109956" y="2862707"/>
+            <a:ext cx="651286" cy="473342"/>
+          </a:xfrm>
+          <a:prstGeom prst="rect">
+            <a:avLst/>
+          </a:prstGeom>
+        </p:spPr>
+        <p:style>
+          <a:lnRef idx="2">
+            <a:schemeClr val="accent2">
+              <a:shade val="50000"/>
+            </a:schemeClr>
+          </a:lnRef>
+          <a:fillRef idx="1">
+            <a:schemeClr val="accent2"/>
+          </a:fillRef>
+          <a:effectRef idx="0">
+            <a:schemeClr val="accent2"/>
+          </a:effectRef>
+          <a:fontRef idx="minor">
+            <a:schemeClr val="lt1"/>
+          </a:fontRef>
+        </p:style>
+        <p:txBody>
+          <a:bodyPr rtlCol="0" anchor="ctr"/>
+          <a:lstStyle/>
+          <a:p>
+            <a:pPr algn="ctr"/>
+            <a:r>
+              <a:rPr lang="en-US" dirty="0"/>
+              <a:t>2,3</a:t>
+            </a:r>
+          </a:p>
+        </p:txBody>
+      </p:sp>
+      <p:sp>
+        <p:nvSpPr>
+          <p:cNvPr id="29" name="Rectangle 28">
+            <a:extLst>
+              <a:ext uri="{FF2B5EF4-FFF2-40B4-BE49-F238E27FC236}">
+                <a16:creationId xmlns:a16="http://schemas.microsoft.com/office/drawing/2014/main" id="{E18965D4-85BA-4D42-BF4F-D5384239856A}"/>
+              </a:ext>
+            </a:extLst>
+          </p:cNvPr>
+          <p:cNvSpPr/>
+          <p:nvPr/>
+        </p:nvSpPr>
+        <p:spPr>
+          <a:xfrm>
+            <a:off x="7971863" y="2874474"/>
+            <a:ext cx="651286" cy="473342"/>
+          </a:xfrm>
+          <a:prstGeom prst="rect">
+            <a:avLst/>
+          </a:prstGeom>
+        </p:spPr>
+        <p:style>
+          <a:lnRef idx="2">
+            <a:schemeClr val="accent2">
+              <a:shade val="50000"/>
+            </a:schemeClr>
+          </a:lnRef>
+          <a:fillRef idx="1">
+            <a:schemeClr val="accent2"/>
+          </a:fillRef>
+          <a:effectRef idx="0">
+            <a:schemeClr val="accent2"/>
+          </a:effectRef>
+          <a:fontRef idx="minor">
+            <a:schemeClr val="lt1"/>
+          </a:fontRef>
+        </p:style>
+        <p:txBody>
+          <a:bodyPr rtlCol="0" anchor="ctr"/>
+          <a:lstStyle/>
+          <a:p>
+            <a:pPr algn="ctr"/>
+            <a:r>
+              <a:rPr lang="en-US" dirty="0"/>
+              <a:t>2,1</a:t>
+            </a:r>
+          </a:p>
+        </p:txBody>
+      </p:sp>
+      <p:sp>
+        <p:nvSpPr>
+          <p:cNvPr id="30" name="Rectangle 29">
+            <a:extLst>
+              <a:ext uri="{FF2B5EF4-FFF2-40B4-BE49-F238E27FC236}">
+                <a16:creationId xmlns:a16="http://schemas.microsoft.com/office/drawing/2014/main" id="{21981EFE-A307-F241-A3BD-E21490018B7A}"/>
+              </a:ext>
+            </a:extLst>
+          </p:cNvPr>
+          <p:cNvSpPr/>
+          <p:nvPr/>
+        </p:nvSpPr>
+        <p:spPr>
+          <a:xfrm>
+            <a:off x="7054437" y="2874474"/>
+            <a:ext cx="651286" cy="473342"/>
+          </a:xfrm>
+          <a:prstGeom prst="rect">
+            <a:avLst/>
+          </a:prstGeom>
+        </p:spPr>
+        <p:style>
+          <a:lnRef idx="1">
+            <a:schemeClr val="accent2"/>
+          </a:lnRef>
+          <a:fillRef idx="2">
+            <a:schemeClr val="accent2"/>
+          </a:fillRef>
+          <a:effectRef idx="1">
+            <a:schemeClr val="accent2"/>
+          </a:effectRef>
+          <a:fontRef idx="minor">
+            <a:schemeClr val="dk1"/>
+          </a:fontRef>
+        </p:style>
+        <p:txBody>
+          <a:bodyPr rtlCol="0" anchor="ctr"/>
+          <a:lstStyle/>
+          <a:p>
+            <a:pPr algn="ctr"/>
+            <a:r>
+              <a:rPr lang="en-US" dirty="0"/>
+              <a:t>2,1 p</a:t>
+            </a:r>
+          </a:p>
+        </p:txBody>
+      </p:sp>
+      <p:sp>
+        <p:nvSpPr>
+          <p:cNvPr id="35" name="U-Turn Arrow 34">
+            <a:extLst>
+              <a:ext uri="{FF2B5EF4-FFF2-40B4-BE49-F238E27FC236}">
+                <a16:creationId xmlns:a16="http://schemas.microsoft.com/office/drawing/2014/main" id="{F55BD660-FDC0-7940-8458-5513CB5889B6}"/>
+              </a:ext>
+            </a:extLst>
+          </p:cNvPr>
+          <p:cNvSpPr/>
+          <p:nvPr/>
+        </p:nvSpPr>
+        <p:spPr>
+          <a:xfrm flipH="1">
+            <a:off x="7315199" y="2603352"/>
+            <a:ext cx="2694791" cy="259355"/>
+          </a:xfrm>
+          <a:prstGeom prst="uturnArrow">
+            <a:avLst>
+              <a:gd name="adj1" fmla="val 30613"/>
+              <a:gd name="adj2" fmla="val 25000"/>
+              <a:gd name="adj3" fmla="val 31786"/>
+              <a:gd name="adj4" fmla="val 50000"/>
+              <a:gd name="adj5" fmla="val 100000"/>
+            </a:avLst>
+          </a:prstGeom>
+        </p:spPr>
+        <p:style>
+          <a:lnRef idx="1">
+            <a:schemeClr val="accent2"/>
+          </a:lnRef>
+          <a:fillRef idx="2">
+            <a:schemeClr val="accent2"/>
+          </a:fillRef>
+          <a:effectRef idx="1">
+            <a:schemeClr val="accent2"/>
+          </a:effectRef>
+          <a:fontRef idx="minor">
+            <a:schemeClr val="dk1"/>
+          </a:fontRef>
+        </p:style>
+        <p:txBody>
+          <a:bodyPr rtlCol="0" anchor="ctr"/>
+          <a:lstStyle/>
+          <a:p>
+            <a:pPr algn="ctr"/>
+            <a:endParaRPr lang="en-US">
+              <a:solidFill>
+                <a:schemeClr val="tx1"/>
+              </a:solidFill>
+            </a:endParaRPr>
+          </a:p>
+        </p:txBody>
+      </p:sp>
+      <p:sp>
+        <p:nvSpPr>
+          <p:cNvPr id="36" name="Rectangle 35">
+            <a:extLst>
+              <a:ext uri="{FF2B5EF4-FFF2-40B4-BE49-F238E27FC236}">
+                <a16:creationId xmlns:a16="http://schemas.microsoft.com/office/drawing/2014/main" id="{A97311B4-2B08-D041-B22B-C83AF33C0237}"/>
+              </a:ext>
+            </a:extLst>
+          </p:cNvPr>
+          <p:cNvSpPr/>
+          <p:nvPr/>
+        </p:nvSpPr>
+        <p:spPr>
+          <a:xfrm>
+            <a:off x="9111736" y="3568194"/>
+            <a:ext cx="651286" cy="473342"/>
+          </a:xfrm>
+          <a:prstGeom prst="rect">
+            <a:avLst/>
+          </a:prstGeom>
+        </p:spPr>
+        <p:style>
+          <a:lnRef idx="2">
+            <a:schemeClr val="accent2">
+              <a:shade val="50000"/>
+            </a:schemeClr>
+          </a:lnRef>
+          <a:fillRef idx="1">
+            <a:schemeClr val="accent2"/>
+          </a:fillRef>
+          <a:effectRef idx="0">
+            <a:schemeClr val="accent2"/>
+          </a:effectRef>
+          <a:fontRef idx="minor">
+            <a:schemeClr val="lt1"/>
+          </a:fontRef>
+        </p:style>
+        <p:txBody>
+          <a:bodyPr rtlCol="0" anchor="ctr"/>
+          <a:lstStyle/>
+          <a:p>
+            <a:pPr algn="ctr"/>
+            <a:r>
+              <a:rPr lang="en-US" dirty="0"/>
+              <a:t>2,1</a:t>
+            </a:r>
+          </a:p>
+        </p:txBody>
+      </p:sp>
+      <p:sp>
+        <p:nvSpPr>
+          <p:cNvPr id="37" name="Rectangle 36">
+            <a:extLst>
+              <a:ext uri="{FF2B5EF4-FFF2-40B4-BE49-F238E27FC236}">
+                <a16:creationId xmlns:a16="http://schemas.microsoft.com/office/drawing/2014/main" id="{5D500839-A966-3846-8231-34E09BF41B01}"/>
+              </a:ext>
+            </a:extLst>
+          </p:cNvPr>
+          <p:cNvSpPr/>
+          <p:nvPr/>
+        </p:nvSpPr>
+        <p:spPr>
+          <a:xfrm>
+            <a:off x="9763022" y="3568194"/>
+            <a:ext cx="651286" cy="473342"/>
+          </a:xfrm>
+          <a:prstGeom prst="rect">
+            <a:avLst/>
+          </a:prstGeom>
+        </p:spPr>
+        <p:style>
+          <a:lnRef idx="1">
+            <a:schemeClr val="accent2"/>
+          </a:lnRef>
+          <a:fillRef idx="2">
+            <a:schemeClr val="accent2"/>
+          </a:fillRef>
+          <a:effectRef idx="1">
+            <a:schemeClr val="accent2"/>
+          </a:effectRef>
+          <a:fontRef idx="minor">
+            <a:schemeClr val="dk1"/>
+          </a:fontRef>
+        </p:style>
+        <p:txBody>
+          <a:bodyPr rtlCol="0" anchor="ctr"/>
+          <a:lstStyle/>
+          <a:p>
+            <a:pPr algn="ctr"/>
+            <a:r>
+              <a:rPr lang="en-US" dirty="0"/>
+              <a:t>2,1 p</a:t>
+            </a:r>
+          </a:p>
+        </p:txBody>
+      </p:sp>
+      <p:sp>
+        <p:nvSpPr>
+          <p:cNvPr id="39" name="Bent Arrow 38">
+            <a:extLst>
+              <a:ext uri="{FF2B5EF4-FFF2-40B4-BE49-F238E27FC236}">
+                <a16:creationId xmlns:a16="http://schemas.microsoft.com/office/drawing/2014/main" id="{8D72D065-FAF5-D546-B767-C81E36984FCD}"/>
+              </a:ext>
+            </a:extLst>
+          </p:cNvPr>
+          <p:cNvSpPr/>
+          <p:nvPr/>
+        </p:nvSpPr>
+        <p:spPr>
+          <a:xfrm rot="10800000" flipH="1">
+            <a:off x="8278769" y="3359582"/>
+            <a:ext cx="717747" cy="524159"/>
+          </a:xfrm>
+          <a:prstGeom prst="bentArrow">
+            <a:avLst>
+              <a:gd name="adj1" fmla="val 9409"/>
+              <a:gd name="adj2" fmla="val 17849"/>
+              <a:gd name="adj3" fmla="val 25000"/>
+              <a:gd name="adj4" fmla="val 43750"/>
+            </a:avLst>
+          </a:prstGeom>
+        </p:spPr>
+        <p:style>
+          <a:lnRef idx="2">
+            <a:schemeClr val="accent3">
+              <a:shade val="50000"/>
+            </a:schemeClr>
+          </a:lnRef>
+          <a:fillRef idx="1">
+            <a:schemeClr val="accent3"/>
+          </a:fillRef>
+          <a:effectRef idx="0">
+            <a:schemeClr val="accent3"/>
+          </a:effectRef>
+          <a:fontRef idx="minor">
+            <a:schemeClr val="lt1"/>
+          </a:fontRef>
+        </p:style>
+        <p:txBody>
+          <a:bodyPr rtlCol="0" anchor="ctr"/>
+          <a:lstStyle/>
+          <a:p>
+            <a:pPr algn="ctr"/>
+            <a:endParaRPr lang="en-US">
+              <a:solidFill>
+                <a:schemeClr val="tx1"/>
+              </a:solidFill>
+            </a:endParaRPr>
+          </a:p>
+        </p:txBody>
+      </p:sp>
+      <p:sp>
+        <p:nvSpPr>
+          <p:cNvPr id="40" name="TextBox 39">
+            <a:extLst>
+              <a:ext uri="{FF2B5EF4-FFF2-40B4-BE49-F238E27FC236}">
+                <a16:creationId xmlns:a16="http://schemas.microsoft.com/office/drawing/2014/main" id="{3EAFF86F-08BD-3B4C-BD07-C529A8C2751C}"/>
+              </a:ext>
+            </a:extLst>
+          </p:cNvPr>
+          <p:cNvSpPr txBox="1"/>
+          <p:nvPr/>
+        </p:nvSpPr>
+        <p:spPr>
+          <a:xfrm>
+            <a:off x="8379824" y="3506196"/>
+            <a:ext cx="565539" cy="307777"/>
+          </a:xfrm>
+          <a:prstGeom prst="rect">
+            <a:avLst/>
+          </a:prstGeom>
+          <a:noFill/>
+        </p:spPr>
+        <p:txBody>
+          <a:bodyPr wrap="none" rtlCol="0">
+            <a:spAutoFit/>
+          </a:bodyPr>
+          <a:lstStyle/>
+          <a:p>
+            <a:r>
+              <a:rPr lang="en-US" sz="1400" dirty="0"/>
+              <a:t>.then</a:t>
+            </a:r>
+          </a:p>
+        </p:txBody>
+      </p:sp>
+      <p:sp>
+        <p:nvSpPr>
+          <p:cNvPr id="41" name="Right Arrow 40">
+            <a:extLst>
+              <a:ext uri="{FF2B5EF4-FFF2-40B4-BE49-F238E27FC236}">
+                <a16:creationId xmlns:a16="http://schemas.microsoft.com/office/drawing/2014/main" id="{30972BC8-A47D-9746-95AF-B3B8669F1C5A}"/>
+              </a:ext>
+            </a:extLst>
+          </p:cNvPr>
+          <p:cNvSpPr/>
+          <p:nvPr/>
+        </p:nvSpPr>
+        <p:spPr>
+          <a:xfrm>
+            <a:off x="10532713" y="3730751"/>
+            <a:ext cx="821087" cy="166757"/>
+          </a:xfrm>
+          <a:prstGeom prst="rightArrow">
+            <a:avLst>
+              <a:gd name="adj1" fmla="val 26351"/>
+              <a:gd name="adj2" fmla="val 63346"/>
+            </a:avLst>
+          </a:prstGeom>
+        </p:spPr>
+        <p:style>
+          <a:lnRef idx="2">
+            <a:schemeClr val="accent3">
+              <a:shade val="50000"/>
+            </a:schemeClr>
+          </a:lnRef>
+          <a:fillRef idx="1">
+            <a:schemeClr val="accent3"/>
+          </a:fillRef>
+          <a:effectRef idx="0">
+            <a:schemeClr val="accent3"/>
+          </a:effectRef>
+          <a:fontRef idx="minor">
+            <a:schemeClr val="lt1"/>
+          </a:fontRef>
+        </p:style>
+        <p:txBody>
+          <a:bodyPr rtlCol="0" anchor="ctr"/>
+          <a:lstStyle/>
+          <a:p>
+            <a:pPr algn="ctr"/>
+            <a:endParaRPr lang="en-US"/>
+          </a:p>
+        </p:txBody>
+      </p:sp>
+      <p:sp>
+        <p:nvSpPr>
+          <p:cNvPr id="42" name="TextBox 41">
+            <a:extLst>
+              <a:ext uri="{FF2B5EF4-FFF2-40B4-BE49-F238E27FC236}">
+                <a16:creationId xmlns:a16="http://schemas.microsoft.com/office/drawing/2014/main" id="{3A90A72C-4BD4-C24F-A489-D24FAFD23459}"/>
+              </a:ext>
+            </a:extLst>
+          </p:cNvPr>
+          <p:cNvSpPr txBox="1"/>
+          <p:nvPr/>
+        </p:nvSpPr>
+        <p:spPr>
+          <a:xfrm>
+            <a:off x="10532714" y="3519964"/>
+            <a:ext cx="646203" cy="307777"/>
+          </a:xfrm>
+          <a:prstGeom prst="rect">
+            <a:avLst/>
+          </a:prstGeom>
+          <a:noFill/>
+        </p:spPr>
+        <p:txBody>
+          <a:bodyPr wrap="none" rtlCol="0">
+            <a:spAutoFit/>
+          </a:bodyPr>
+          <a:lstStyle/>
+          <a:p>
+            <a:r>
+              <a:rPr lang="en-US" sz="1400" dirty="0"/>
+              <a:t>return</a:t>
+            </a:r>
+          </a:p>
+        </p:txBody>
+      </p:sp>
+    </p:spTree>
+    <p:extLst>
+      <p:ext uri="{BB962C8B-B14F-4D97-AF65-F5344CB8AC3E}">
+        <p14:creationId xmlns:p14="http://schemas.microsoft.com/office/powerpoint/2010/main" val="3546963974"/>
+      </p:ext>
+    </p:extLst>
+  </p:cSld>
+  <p:clrMapOvr>
+    <a:masterClrMapping/>
+  </p:clrMapOvr>
+</p:sld>
+</file>
+
+<file path=ppt/slides/slide11.xml><?xml version="1.0" encoding="utf-8"?>
+<p:sld xmlns:a="http://schemas.openxmlformats.org/drawingml/2006/main" xmlns:r="http://schemas.openxmlformats.org/officeDocument/2006/relationships" xmlns:p="http://schemas.openxmlformats.org/presentationml/2006/main">
+  <p:cSld>
+    <p:spTree>
+      <p:nvGrpSpPr>
+        <p:cNvPr id="1" name=""/>
+        <p:cNvGrpSpPr/>
+        <p:nvPr/>
+      </p:nvGrpSpPr>
+      <p:grpSpPr>
+        <a:xfrm>
+          <a:off x="0" y="0"/>
+          <a:ext cx="0" cy="0"/>
+          <a:chOff x="0" y="0"/>
+          <a:chExt cx="0" cy="0"/>
+        </a:xfrm>
+      </p:grpSpPr>
+      <p:sp>
+        <p:nvSpPr>
+          <p:cNvPr id="3" name="Content Placeholder 2">
+            <a:extLst>
+              <a:ext uri="{FF2B5EF4-FFF2-40B4-BE49-F238E27FC236}">
+                <a16:creationId xmlns:a16="http://schemas.microsoft.com/office/drawing/2014/main" id="{8065CE91-9491-9143-A1E4-2BA3F3AA7BDA}"/>
+              </a:ext>
+            </a:extLst>
+          </p:cNvPr>
+          <p:cNvSpPr>
+            <a:spLocks noGrp="1"/>
+          </p:cNvSpPr>
+          <p:nvPr>
+            <p:ph idx="1"/>
+          </p:nvPr>
+        </p:nvSpPr>
+        <p:spPr>
+          <a:xfrm>
+            <a:off x="838200" y="1825624"/>
+            <a:ext cx="10515600" cy="4712335"/>
+          </a:xfrm>
+        </p:spPr>
+        <p:txBody>
+          <a:bodyPr>
+            <a:normAutofit/>
+          </a:bodyPr>
+          <a:lstStyle/>
+          <a:p>
+            <a:r>
+              <a:rPr lang="en-US" dirty="0"/>
+              <a:t>When read(2,1) is called on the</a:t>
+            </a:r>
+            <a:br>
+              <a:rPr lang="en-US" dirty="0"/>
+            </a:br>
+            <a:r>
+              <a:rPr lang="en-US" dirty="0"/>
+              <a:t>orange rank:</a:t>
+            </a:r>
+          </a:p>
+          <a:p>
+            <a:pPr lvl="1"/>
+            <a:r>
+              <a:rPr lang="en-US" dirty="0"/>
+              <a:t>If the shared future of 2,1 doesn’t exist:</a:t>
+            </a:r>
+          </a:p>
+          <a:p>
+            <a:pPr lvl="2"/>
+            <a:r>
+              <a:rPr lang="en-US" dirty="0"/>
+              <a:t>a promise&lt;Tile&gt; “2,1 p” is created</a:t>
+            </a:r>
+          </a:p>
+          <a:p>
+            <a:pPr lvl="2"/>
+            <a:r>
+              <a:rPr lang="en-US" dirty="0"/>
+              <a:t>the future&lt;Tile&gt; is replaced</a:t>
+            </a:r>
+            <a:br>
+              <a:rPr lang="en-US" dirty="0"/>
+            </a:br>
+            <a:r>
+              <a:rPr lang="en-US" dirty="0"/>
+              <a:t>by the future of the promise “2,1 n”</a:t>
+            </a:r>
+          </a:p>
+          <a:p>
+            <a:pPr lvl="2"/>
+            <a:r>
+              <a:rPr lang="en-US" dirty="0"/>
+              <a:t>a </a:t>
+            </a:r>
+            <a:r>
+              <a:rPr lang="en-US" dirty="0" err="1"/>
+              <a:t>shared_future</a:t>
+            </a:r>
+            <a:r>
+              <a:rPr lang="en-US" dirty="0"/>
+              <a:t>&lt;Wrapper&lt;Tile&gt;&gt; “2,1 sf” is created</a:t>
+            </a:r>
+            <a:br>
+              <a:rPr lang="en-US" dirty="0"/>
+            </a:br>
+            <a:r>
+              <a:rPr lang="en-US" dirty="0"/>
+              <a:t>from the “old” future&lt;Tile&gt; stored in the pointer and returned.</a:t>
+            </a:r>
+          </a:p>
+          <a:p>
+            <a:pPr lvl="1"/>
+            <a:r>
+              <a:rPr lang="en-US" dirty="0"/>
+              <a:t>Otherwise the shared future is returned</a:t>
+            </a:r>
+          </a:p>
+          <a:p>
+            <a:pPr lvl="2"/>
+            <a:r>
+              <a:rPr lang="en-US" dirty="0"/>
+              <a:t>The copy of the </a:t>
+            </a:r>
+            <a:r>
+              <a:rPr lang="en-US" dirty="0" err="1"/>
+              <a:t>shared_future</a:t>
+            </a:r>
+            <a:r>
+              <a:rPr lang="en-US" dirty="0"/>
+              <a:t> stored in the Matrix is destroyed when operator() is called for the same tile.</a:t>
+            </a:r>
+          </a:p>
+          <a:p>
+            <a:pPr lvl="1"/>
+            <a:r>
+              <a:rPr lang="en-US" dirty="0"/>
+              <a:t>After </a:t>
+            </a:r>
+            <a:r>
+              <a:rPr lang="en-US" dirty="0">
+                <a:solidFill>
+                  <a:srgbClr val="FF0000"/>
+                </a:solidFill>
+              </a:rPr>
+              <a:t>all</a:t>
+            </a:r>
+            <a:r>
+              <a:rPr lang="en-US" dirty="0"/>
+              <a:t> the task that read the Tile 2,1 are finished, the destructor of Wrapper&lt;Tile&gt; is called. It sets the value of “2,1 p” moving the modified Tile. </a:t>
+            </a:r>
+          </a:p>
+          <a:p>
+            <a:pPr lvl="1"/>
+            <a:endParaRPr lang="en-US" dirty="0"/>
+          </a:p>
+        </p:txBody>
+      </p:sp>
+      <p:sp>
+        <p:nvSpPr>
+          <p:cNvPr id="38" name="Rectangle 37">
+            <a:extLst>
+              <a:ext uri="{FF2B5EF4-FFF2-40B4-BE49-F238E27FC236}">
+                <a16:creationId xmlns:a16="http://schemas.microsoft.com/office/drawing/2014/main" id="{2ECCCAE9-F67B-2142-BFE0-F99ADDD1A6CB}"/>
+              </a:ext>
+            </a:extLst>
+          </p:cNvPr>
+          <p:cNvSpPr/>
+          <p:nvPr/>
+        </p:nvSpPr>
+        <p:spPr>
+          <a:xfrm>
+            <a:off x="9075174" y="2519192"/>
+            <a:ext cx="1524000" cy="648929"/>
+          </a:xfrm>
+          <a:prstGeom prst="rect">
+            <a:avLst/>
+          </a:prstGeom>
+        </p:spPr>
+        <p:style>
+          <a:lnRef idx="2">
+            <a:schemeClr val="accent3">
+              <a:shade val="50000"/>
+            </a:schemeClr>
+          </a:lnRef>
+          <a:fillRef idx="1">
+            <a:schemeClr val="accent3"/>
+          </a:fillRef>
+          <a:effectRef idx="0">
+            <a:schemeClr val="accent3"/>
+          </a:effectRef>
+          <a:fontRef idx="minor">
+            <a:schemeClr val="lt1"/>
+          </a:fontRef>
+        </p:style>
+        <p:txBody>
+          <a:bodyPr rtlCol="0" anchor="ctr"/>
+          <a:lstStyle/>
+          <a:p>
+            <a:pPr algn="ctr"/>
+            <a:endParaRPr lang="en-US"/>
+          </a:p>
+        </p:txBody>
+      </p:sp>
+      <p:sp>
+        <p:nvSpPr>
+          <p:cNvPr id="2" name="Title 1">
+            <a:extLst>
+              <a:ext uri="{FF2B5EF4-FFF2-40B4-BE49-F238E27FC236}">
+                <a16:creationId xmlns:a16="http://schemas.microsoft.com/office/drawing/2014/main" id="{CE0F46F3-BC9F-5644-AD8F-0CC76BAA1902}"/>
+              </a:ext>
+            </a:extLst>
+          </p:cNvPr>
+          <p:cNvSpPr>
+            <a:spLocks noGrp="1"/>
+          </p:cNvSpPr>
+          <p:nvPr>
+            <p:ph type="title"/>
+          </p:nvPr>
+        </p:nvSpPr>
+        <p:spPr>
+          <a:xfrm>
+            <a:off x="838200" y="365125"/>
+            <a:ext cx="10515600" cy="1325563"/>
+          </a:xfrm>
+        </p:spPr>
+        <p:txBody>
+          <a:bodyPr/>
+          <a:lstStyle/>
+          <a:p>
+            <a:r>
+              <a:rPr lang="en-US" dirty="0"/>
+              <a:t>Example read() orange rank:</a:t>
+            </a:r>
+          </a:p>
+        </p:txBody>
+      </p:sp>
+      <p:sp>
+        <p:nvSpPr>
+          <p:cNvPr id="5" name="Rectangle 4">
+            <a:extLst>
+              <a:ext uri="{FF2B5EF4-FFF2-40B4-BE49-F238E27FC236}">
+                <a16:creationId xmlns:a16="http://schemas.microsoft.com/office/drawing/2014/main" id="{3B54EB16-7A5B-8A43-9817-9997554CD933}"/>
+              </a:ext>
+            </a:extLst>
+          </p:cNvPr>
+          <p:cNvSpPr/>
+          <p:nvPr/>
+        </p:nvSpPr>
+        <p:spPr>
+          <a:xfrm>
+            <a:off x="8967947" y="609563"/>
+            <a:ext cx="651286" cy="473342"/>
+          </a:xfrm>
+          <a:prstGeom prst="rect">
+            <a:avLst/>
+          </a:prstGeom>
+        </p:spPr>
+        <p:style>
+          <a:lnRef idx="2">
+            <a:schemeClr val="accent2">
+              <a:shade val="50000"/>
+            </a:schemeClr>
+          </a:lnRef>
+          <a:fillRef idx="1">
+            <a:schemeClr val="accent2"/>
+          </a:fillRef>
+          <a:effectRef idx="0">
+            <a:schemeClr val="accent2"/>
+          </a:effectRef>
+          <a:fontRef idx="minor">
+            <a:schemeClr val="lt1"/>
+          </a:fontRef>
+        </p:style>
+        <p:txBody>
+          <a:bodyPr rtlCol="0" anchor="ctr"/>
+          <a:lstStyle/>
+          <a:p>
+            <a:pPr algn="ctr"/>
+            <a:r>
+              <a:rPr lang="en-US" dirty="0"/>
+              <a:t>0,1</a:t>
+            </a:r>
+          </a:p>
+        </p:txBody>
+      </p:sp>
+      <p:sp>
+        <p:nvSpPr>
+          <p:cNvPr id="10" name="Rectangle 9">
+            <a:extLst>
+              <a:ext uri="{FF2B5EF4-FFF2-40B4-BE49-F238E27FC236}">
+                <a16:creationId xmlns:a16="http://schemas.microsoft.com/office/drawing/2014/main" id="{F9613E89-3C6D-834E-A737-1A05FB110829}"/>
+              </a:ext>
+            </a:extLst>
+          </p:cNvPr>
+          <p:cNvSpPr/>
+          <p:nvPr/>
+        </p:nvSpPr>
+        <p:spPr>
+          <a:xfrm>
+            <a:off x="9722441" y="597796"/>
+            <a:ext cx="651286" cy="473342"/>
+          </a:xfrm>
+          <a:prstGeom prst="rect">
+            <a:avLst/>
+          </a:prstGeom>
+        </p:spPr>
+        <p:style>
+          <a:lnRef idx="2">
+            <a:schemeClr val="accent2">
+              <a:shade val="50000"/>
+            </a:schemeClr>
+          </a:lnRef>
+          <a:fillRef idx="1">
+            <a:schemeClr val="accent2"/>
+          </a:fillRef>
+          <a:effectRef idx="0">
+            <a:schemeClr val="accent2"/>
+          </a:effectRef>
+          <a:fontRef idx="minor">
+            <a:schemeClr val="lt1"/>
+          </a:fontRef>
+        </p:style>
+        <p:txBody>
+          <a:bodyPr rtlCol="0" anchor="ctr"/>
+          <a:lstStyle/>
+          <a:p>
+            <a:pPr algn="ctr"/>
+            <a:r>
+              <a:rPr lang="en-US" dirty="0"/>
+              <a:t>2,1</a:t>
+            </a:r>
+          </a:p>
+        </p:txBody>
+      </p:sp>
+      <p:sp>
+        <p:nvSpPr>
+          <p:cNvPr id="14" name="Rectangle 13">
+            <a:extLst>
+              <a:ext uri="{FF2B5EF4-FFF2-40B4-BE49-F238E27FC236}">
+                <a16:creationId xmlns:a16="http://schemas.microsoft.com/office/drawing/2014/main" id="{8377B2CB-A14F-7647-90C7-D2F4420145D2}"/>
+              </a:ext>
+            </a:extLst>
+          </p:cNvPr>
+          <p:cNvSpPr/>
+          <p:nvPr/>
+        </p:nvSpPr>
+        <p:spPr>
+          <a:xfrm>
+            <a:off x="10455528" y="597796"/>
+            <a:ext cx="651286" cy="473342"/>
+          </a:xfrm>
+          <a:prstGeom prst="rect">
+            <a:avLst/>
+          </a:prstGeom>
+        </p:spPr>
+        <p:style>
+          <a:lnRef idx="2">
+            <a:schemeClr val="accent2">
+              <a:shade val="50000"/>
+            </a:schemeClr>
+          </a:lnRef>
+          <a:fillRef idx="1">
+            <a:schemeClr val="accent2"/>
+          </a:fillRef>
+          <a:effectRef idx="0">
+            <a:schemeClr val="accent2"/>
+          </a:effectRef>
+          <a:fontRef idx="minor">
+            <a:schemeClr val="lt1"/>
+          </a:fontRef>
+        </p:style>
+        <p:txBody>
+          <a:bodyPr rtlCol="0" anchor="ctr"/>
+          <a:lstStyle/>
+          <a:p>
+            <a:pPr algn="ctr"/>
+            <a:r>
+              <a:rPr lang="en-US" dirty="0"/>
+              <a:t>0,3</a:t>
+            </a:r>
+          </a:p>
+        </p:txBody>
+      </p:sp>
+      <p:sp>
+        <p:nvSpPr>
+          <p:cNvPr id="18" name="Rectangle 17">
+            <a:extLst>
+              <a:ext uri="{FF2B5EF4-FFF2-40B4-BE49-F238E27FC236}">
+                <a16:creationId xmlns:a16="http://schemas.microsoft.com/office/drawing/2014/main" id="{14DA06FB-82C0-B24B-858E-FC6EDBA48007}"/>
+              </a:ext>
+            </a:extLst>
+          </p:cNvPr>
+          <p:cNvSpPr/>
+          <p:nvPr/>
+        </p:nvSpPr>
+        <p:spPr>
+          <a:xfrm>
+            <a:off x="11188615" y="597796"/>
+            <a:ext cx="651286" cy="473342"/>
+          </a:xfrm>
+          <a:prstGeom prst="rect">
+            <a:avLst/>
+          </a:prstGeom>
+        </p:spPr>
+        <p:style>
+          <a:lnRef idx="2">
+            <a:schemeClr val="accent2">
+              <a:shade val="50000"/>
+            </a:schemeClr>
+          </a:lnRef>
+          <a:fillRef idx="1">
+            <a:schemeClr val="accent2"/>
+          </a:fillRef>
+          <a:effectRef idx="0">
+            <a:schemeClr val="accent2"/>
+          </a:effectRef>
+          <a:fontRef idx="minor">
+            <a:schemeClr val="lt1"/>
+          </a:fontRef>
+        </p:style>
+        <p:txBody>
+          <a:bodyPr rtlCol="0" anchor="ctr"/>
+          <a:lstStyle/>
+          <a:p>
+            <a:pPr algn="ctr"/>
+            <a:r>
+              <a:rPr lang="en-US" dirty="0"/>
+              <a:t>2,3</a:t>
+            </a:r>
+          </a:p>
+        </p:txBody>
+      </p:sp>
+      <p:sp>
+        <p:nvSpPr>
+          <p:cNvPr id="25" name="Rectangle 24">
+            <a:extLst>
+              <a:ext uri="{FF2B5EF4-FFF2-40B4-BE49-F238E27FC236}">
+                <a16:creationId xmlns:a16="http://schemas.microsoft.com/office/drawing/2014/main" id="{96E9BA96-A704-5A46-981D-5FB6B3A42990}"/>
+              </a:ext>
+            </a:extLst>
+          </p:cNvPr>
+          <p:cNvSpPr/>
+          <p:nvPr/>
+        </p:nvSpPr>
+        <p:spPr>
+          <a:xfrm>
+            <a:off x="8967947" y="1910913"/>
+            <a:ext cx="651286" cy="473342"/>
+          </a:xfrm>
+          <a:prstGeom prst="rect">
+            <a:avLst/>
+          </a:prstGeom>
+        </p:spPr>
+        <p:style>
+          <a:lnRef idx="2">
+            <a:schemeClr val="accent2">
+              <a:shade val="50000"/>
+            </a:schemeClr>
+          </a:lnRef>
+          <a:fillRef idx="1">
+            <a:schemeClr val="accent2"/>
+          </a:fillRef>
+          <a:effectRef idx="0">
+            <a:schemeClr val="accent2"/>
+          </a:effectRef>
+          <a:fontRef idx="minor">
+            <a:schemeClr val="lt1"/>
+          </a:fontRef>
+        </p:style>
+        <p:txBody>
+          <a:bodyPr rtlCol="0" anchor="ctr"/>
+          <a:lstStyle/>
+          <a:p>
+            <a:pPr algn="ctr"/>
+            <a:r>
+              <a:rPr lang="en-US" dirty="0"/>
+              <a:t>0,1</a:t>
+            </a:r>
+          </a:p>
+        </p:txBody>
+      </p:sp>
+      <p:sp>
+        <p:nvSpPr>
+          <p:cNvPr id="26" name="Rectangle 25">
+            <a:extLst>
+              <a:ext uri="{FF2B5EF4-FFF2-40B4-BE49-F238E27FC236}">
+                <a16:creationId xmlns:a16="http://schemas.microsoft.com/office/drawing/2014/main" id="{6F7FF820-0492-8C4D-9818-CE60A1FD1237}"/>
+              </a:ext>
+            </a:extLst>
+          </p:cNvPr>
+          <p:cNvSpPr/>
+          <p:nvPr/>
+        </p:nvSpPr>
+        <p:spPr>
+          <a:xfrm>
+            <a:off x="9722441" y="1899146"/>
+            <a:ext cx="651286" cy="473342"/>
+          </a:xfrm>
+          <a:prstGeom prst="rect">
+            <a:avLst/>
+          </a:prstGeom>
+        </p:spPr>
+        <p:style>
+          <a:lnRef idx="1">
+            <a:schemeClr val="accent2"/>
+          </a:lnRef>
+          <a:fillRef idx="2">
+            <a:schemeClr val="accent2"/>
+          </a:fillRef>
+          <a:effectRef idx="1">
+            <a:schemeClr val="accent2"/>
+          </a:effectRef>
+          <a:fontRef idx="minor">
+            <a:schemeClr val="dk1"/>
+          </a:fontRef>
+        </p:style>
+        <p:txBody>
+          <a:bodyPr rtlCol="0" anchor="ctr"/>
+          <a:lstStyle/>
+          <a:p>
+            <a:pPr algn="ctr"/>
+            <a:r>
+              <a:rPr lang="en-US" dirty="0"/>
+              <a:t>2,1 n</a:t>
+            </a:r>
+          </a:p>
+        </p:txBody>
+      </p:sp>
+      <p:sp>
+        <p:nvSpPr>
+          <p:cNvPr id="27" name="Rectangle 26">
+            <a:extLst>
+              <a:ext uri="{FF2B5EF4-FFF2-40B4-BE49-F238E27FC236}">
+                <a16:creationId xmlns:a16="http://schemas.microsoft.com/office/drawing/2014/main" id="{286DEF19-F25E-7E4B-95BB-345ECCB5D2EA}"/>
+              </a:ext>
+            </a:extLst>
+          </p:cNvPr>
+          <p:cNvSpPr/>
+          <p:nvPr/>
+        </p:nvSpPr>
+        <p:spPr>
+          <a:xfrm>
+            <a:off x="10455528" y="1899146"/>
+            <a:ext cx="651286" cy="473342"/>
+          </a:xfrm>
+          <a:prstGeom prst="rect">
+            <a:avLst/>
+          </a:prstGeom>
+        </p:spPr>
+        <p:style>
+          <a:lnRef idx="2">
+            <a:schemeClr val="accent2">
+              <a:shade val="50000"/>
+            </a:schemeClr>
+          </a:lnRef>
+          <a:fillRef idx="1">
+            <a:schemeClr val="accent2"/>
+          </a:fillRef>
+          <a:effectRef idx="0">
+            <a:schemeClr val="accent2"/>
+          </a:effectRef>
+          <a:fontRef idx="minor">
+            <a:schemeClr val="lt1"/>
+          </a:fontRef>
+        </p:style>
+        <p:txBody>
+          <a:bodyPr rtlCol="0" anchor="ctr"/>
+          <a:lstStyle/>
+          <a:p>
+            <a:pPr algn="ctr"/>
+            <a:r>
+              <a:rPr lang="en-US" dirty="0"/>
+              <a:t>0,3</a:t>
+            </a:r>
+          </a:p>
+        </p:txBody>
+      </p:sp>
+      <p:sp>
+        <p:nvSpPr>
+          <p:cNvPr id="28" name="Rectangle 27">
+            <a:extLst>
+              <a:ext uri="{FF2B5EF4-FFF2-40B4-BE49-F238E27FC236}">
+                <a16:creationId xmlns:a16="http://schemas.microsoft.com/office/drawing/2014/main" id="{AD4080A3-F76A-5A47-9A36-5D01637C5BDF}"/>
+              </a:ext>
+            </a:extLst>
+          </p:cNvPr>
+          <p:cNvSpPr/>
+          <p:nvPr/>
+        </p:nvSpPr>
+        <p:spPr>
+          <a:xfrm>
+            <a:off x="11188614" y="1899146"/>
+            <a:ext cx="651286" cy="473342"/>
+          </a:xfrm>
+          <a:prstGeom prst="rect">
+            <a:avLst/>
+          </a:prstGeom>
+        </p:spPr>
+        <p:style>
+          <a:lnRef idx="2">
+            <a:schemeClr val="accent2">
+              <a:shade val="50000"/>
+            </a:schemeClr>
+          </a:lnRef>
+          <a:fillRef idx="1">
+            <a:schemeClr val="accent2"/>
+          </a:fillRef>
+          <a:effectRef idx="0">
+            <a:schemeClr val="accent2"/>
+          </a:effectRef>
+          <a:fontRef idx="minor">
+            <a:schemeClr val="lt1"/>
+          </a:fontRef>
+        </p:style>
+        <p:txBody>
+          <a:bodyPr rtlCol="0" anchor="ctr"/>
+          <a:lstStyle/>
+          <a:p>
+            <a:pPr algn="ctr"/>
+            <a:r>
+              <a:rPr lang="en-US" dirty="0"/>
+              <a:t>2,3</a:t>
+            </a:r>
+          </a:p>
+        </p:txBody>
+      </p:sp>
+      <p:sp>
+        <p:nvSpPr>
+          <p:cNvPr id="29" name="Rectangle 28">
+            <a:extLst>
+              <a:ext uri="{FF2B5EF4-FFF2-40B4-BE49-F238E27FC236}">
+                <a16:creationId xmlns:a16="http://schemas.microsoft.com/office/drawing/2014/main" id="{E18965D4-85BA-4D42-BF4F-D5384239856A}"/>
+              </a:ext>
+            </a:extLst>
+          </p:cNvPr>
+          <p:cNvSpPr/>
+          <p:nvPr/>
+        </p:nvSpPr>
+        <p:spPr>
+          <a:xfrm>
+            <a:off x="8050521" y="1910913"/>
+            <a:ext cx="651286" cy="473342"/>
+          </a:xfrm>
+          <a:prstGeom prst="rect">
+            <a:avLst/>
+          </a:prstGeom>
+        </p:spPr>
+        <p:style>
+          <a:lnRef idx="2">
+            <a:schemeClr val="accent2">
+              <a:shade val="50000"/>
+            </a:schemeClr>
+          </a:lnRef>
+          <a:fillRef idx="1">
+            <a:schemeClr val="accent2"/>
+          </a:fillRef>
+          <a:effectRef idx="0">
+            <a:schemeClr val="accent2"/>
+          </a:effectRef>
+          <a:fontRef idx="minor">
+            <a:schemeClr val="lt1"/>
+          </a:fontRef>
+        </p:style>
+        <p:txBody>
+          <a:bodyPr rtlCol="0" anchor="ctr"/>
+          <a:lstStyle/>
+          <a:p>
+            <a:pPr algn="ctr"/>
+            <a:r>
+              <a:rPr lang="en-US" dirty="0"/>
+              <a:t>2,1</a:t>
+            </a:r>
+          </a:p>
+        </p:txBody>
+      </p:sp>
+      <p:sp>
+        <p:nvSpPr>
+          <p:cNvPr id="30" name="Rectangle 29">
+            <a:extLst>
+              <a:ext uri="{FF2B5EF4-FFF2-40B4-BE49-F238E27FC236}">
+                <a16:creationId xmlns:a16="http://schemas.microsoft.com/office/drawing/2014/main" id="{21981EFE-A307-F241-A3BD-E21490018B7A}"/>
+              </a:ext>
+            </a:extLst>
+          </p:cNvPr>
+          <p:cNvSpPr/>
+          <p:nvPr/>
+        </p:nvSpPr>
+        <p:spPr>
+          <a:xfrm>
+            <a:off x="7133095" y="1910913"/>
+            <a:ext cx="651286" cy="473342"/>
+          </a:xfrm>
+          <a:prstGeom prst="rect">
+            <a:avLst/>
+          </a:prstGeom>
+        </p:spPr>
+        <p:style>
+          <a:lnRef idx="1">
+            <a:schemeClr val="accent2"/>
+          </a:lnRef>
+          <a:fillRef idx="2">
+            <a:schemeClr val="accent2"/>
+          </a:fillRef>
+          <a:effectRef idx="1">
+            <a:schemeClr val="accent2"/>
+          </a:effectRef>
+          <a:fontRef idx="minor">
+            <a:schemeClr val="dk1"/>
+          </a:fontRef>
+        </p:style>
+        <p:txBody>
+          <a:bodyPr rtlCol="0" anchor="ctr"/>
+          <a:lstStyle/>
+          <a:p>
+            <a:pPr algn="ctr"/>
+            <a:r>
+              <a:rPr lang="en-US" dirty="0"/>
+              <a:t>2,1 p</a:t>
+            </a:r>
+          </a:p>
+        </p:txBody>
+      </p:sp>
+      <p:sp>
+        <p:nvSpPr>
+          <p:cNvPr id="35" name="U-Turn Arrow 34">
+            <a:extLst>
+              <a:ext uri="{FF2B5EF4-FFF2-40B4-BE49-F238E27FC236}">
+                <a16:creationId xmlns:a16="http://schemas.microsoft.com/office/drawing/2014/main" id="{F55BD660-FDC0-7940-8458-5513CB5889B6}"/>
+              </a:ext>
+            </a:extLst>
+          </p:cNvPr>
+          <p:cNvSpPr/>
+          <p:nvPr/>
+        </p:nvSpPr>
+        <p:spPr>
+          <a:xfrm flipH="1">
+            <a:off x="7393857" y="1639791"/>
+            <a:ext cx="2694791" cy="259355"/>
+          </a:xfrm>
+          <a:prstGeom prst="uturnArrow">
+            <a:avLst>
+              <a:gd name="adj1" fmla="val 30613"/>
+              <a:gd name="adj2" fmla="val 25000"/>
+              <a:gd name="adj3" fmla="val 31786"/>
+              <a:gd name="adj4" fmla="val 50000"/>
+              <a:gd name="adj5" fmla="val 100000"/>
+            </a:avLst>
+          </a:prstGeom>
+        </p:spPr>
+        <p:style>
+          <a:lnRef idx="1">
+            <a:schemeClr val="accent2"/>
+          </a:lnRef>
+          <a:fillRef idx="2">
+            <a:schemeClr val="accent2"/>
+          </a:fillRef>
+          <a:effectRef idx="1">
+            <a:schemeClr val="accent2"/>
+          </a:effectRef>
+          <a:fontRef idx="minor">
+            <a:schemeClr val="dk1"/>
+          </a:fontRef>
+        </p:style>
+        <p:txBody>
+          <a:bodyPr rtlCol="0" anchor="ctr"/>
+          <a:lstStyle/>
+          <a:p>
+            <a:pPr algn="ctr"/>
+            <a:endParaRPr lang="en-US">
+              <a:solidFill>
+                <a:schemeClr val="tx1"/>
+              </a:solidFill>
+            </a:endParaRPr>
+          </a:p>
+        </p:txBody>
+      </p:sp>
+      <p:sp>
+        <p:nvSpPr>
+          <p:cNvPr id="36" name="Rectangle 35">
+            <a:extLst>
+              <a:ext uri="{FF2B5EF4-FFF2-40B4-BE49-F238E27FC236}">
+                <a16:creationId xmlns:a16="http://schemas.microsoft.com/office/drawing/2014/main" id="{A97311B4-2B08-D041-B22B-C83AF33C0237}"/>
+              </a:ext>
+            </a:extLst>
+          </p:cNvPr>
+          <p:cNvSpPr/>
+          <p:nvPr/>
+        </p:nvSpPr>
+        <p:spPr>
+          <a:xfrm>
+            <a:off x="9190394" y="2604633"/>
+            <a:ext cx="651286" cy="473342"/>
+          </a:xfrm>
+          <a:prstGeom prst="rect">
+            <a:avLst/>
+          </a:prstGeom>
+        </p:spPr>
+        <p:style>
+          <a:lnRef idx="2">
+            <a:schemeClr val="accent2">
+              <a:shade val="50000"/>
+            </a:schemeClr>
+          </a:lnRef>
+          <a:fillRef idx="1">
+            <a:schemeClr val="accent2"/>
+          </a:fillRef>
+          <a:effectRef idx="0">
+            <a:schemeClr val="accent2"/>
+          </a:effectRef>
+          <a:fontRef idx="minor">
+            <a:schemeClr val="lt1"/>
+          </a:fontRef>
+        </p:style>
+        <p:txBody>
+          <a:bodyPr rtlCol="0" anchor="ctr"/>
+          <a:lstStyle/>
+          <a:p>
+            <a:pPr algn="ctr"/>
+            <a:r>
+              <a:rPr lang="en-US" dirty="0"/>
+              <a:t>2,1</a:t>
+            </a:r>
+          </a:p>
+        </p:txBody>
+      </p:sp>
+      <p:sp>
+        <p:nvSpPr>
+          <p:cNvPr id="37" name="Rectangle 36">
+            <a:extLst>
+              <a:ext uri="{FF2B5EF4-FFF2-40B4-BE49-F238E27FC236}">
+                <a16:creationId xmlns:a16="http://schemas.microsoft.com/office/drawing/2014/main" id="{5D500839-A966-3846-8231-34E09BF41B01}"/>
+              </a:ext>
+            </a:extLst>
+          </p:cNvPr>
+          <p:cNvSpPr/>
+          <p:nvPr/>
+        </p:nvSpPr>
+        <p:spPr>
+          <a:xfrm>
+            <a:off x="9841680" y="2604633"/>
+            <a:ext cx="651286" cy="473342"/>
+          </a:xfrm>
+          <a:prstGeom prst="rect">
+            <a:avLst/>
+          </a:prstGeom>
+        </p:spPr>
+        <p:style>
+          <a:lnRef idx="1">
+            <a:schemeClr val="accent2"/>
+          </a:lnRef>
+          <a:fillRef idx="2">
+            <a:schemeClr val="accent2"/>
+          </a:fillRef>
+          <a:effectRef idx="1">
+            <a:schemeClr val="accent2"/>
+          </a:effectRef>
+          <a:fontRef idx="minor">
+            <a:schemeClr val="dk1"/>
+          </a:fontRef>
+        </p:style>
+        <p:txBody>
+          <a:bodyPr rtlCol="0" anchor="ctr"/>
+          <a:lstStyle/>
+          <a:p>
+            <a:pPr algn="ctr"/>
+            <a:r>
+              <a:rPr lang="en-US" dirty="0"/>
+              <a:t>2,1 p</a:t>
+            </a:r>
+          </a:p>
+        </p:txBody>
+      </p:sp>
+      <p:sp>
+        <p:nvSpPr>
+          <p:cNvPr id="39" name="Bent Arrow 38">
+            <a:extLst>
+              <a:ext uri="{FF2B5EF4-FFF2-40B4-BE49-F238E27FC236}">
+                <a16:creationId xmlns:a16="http://schemas.microsoft.com/office/drawing/2014/main" id="{8D72D065-FAF5-D546-B767-C81E36984FCD}"/>
+              </a:ext>
+            </a:extLst>
+          </p:cNvPr>
+          <p:cNvSpPr/>
+          <p:nvPr/>
+        </p:nvSpPr>
+        <p:spPr>
+          <a:xfrm rot="10800000" flipH="1">
+            <a:off x="8357427" y="2396021"/>
+            <a:ext cx="717747" cy="524159"/>
+          </a:xfrm>
+          <a:prstGeom prst="bentArrow">
+            <a:avLst>
+              <a:gd name="adj1" fmla="val 9409"/>
+              <a:gd name="adj2" fmla="val 17849"/>
+              <a:gd name="adj3" fmla="val 25000"/>
+              <a:gd name="adj4" fmla="val 43750"/>
+            </a:avLst>
+          </a:prstGeom>
+        </p:spPr>
+        <p:style>
+          <a:lnRef idx="2">
+            <a:schemeClr val="accent3">
+              <a:shade val="50000"/>
+            </a:schemeClr>
+          </a:lnRef>
+          <a:fillRef idx="1">
+            <a:schemeClr val="accent3"/>
+          </a:fillRef>
+          <a:effectRef idx="0">
+            <a:schemeClr val="accent3"/>
+          </a:effectRef>
+          <a:fontRef idx="minor">
+            <a:schemeClr val="lt1"/>
+          </a:fontRef>
+        </p:style>
+        <p:txBody>
+          <a:bodyPr rtlCol="0" anchor="ctr"/>
+          <a:lstStyle/>
+          <a:p>
+            <a:pPr algn="ctr"/>
+            <a:endParaRPr lang="en-US">
+              <a:solidFill>
+                <a:schemeClr val="tx1"/>
+              </a:solidFill>
+            </a:endParaRPr>
+          </a:p>
+        </p:txBody>
+      </p:sp>
+      <p:sp>
+        <p:nvSpPr>
+          <p:cNvPr id="40" name="TextBox 39">
+            <a:extLst>
+              <a:ext uri="{FF2B5EF4-FFF2-40B4-BE49-F238E27FC236}">
+                <a16:creationId xmlns:a16="http://schemas.microsoft.com/office/drawing/2014/main" id="{3EAFF86F-08BD-3B4C-BD07-C529A8C2751C}"/>
+              </a:ext>
+            </a:extLst>
+          </p:cNvPr>
+          <p:cNvSpPr txBox="1"/>
+          <p:nvPr/>
+        </p:nvSpPr>
+        <p:spPr>
+          <a:xfrm>
+            <a:off x="8458482" y="2542635"/>
+            <a:ext cx="565539" cy="307777"/>
+          </a:xfrm>
+          <a:prstGeom prst="rect">
+            <a:avLst/>
+          </a:prstGeom>
+          <a:noFill/>
+        </p:spPr>
+        <p:txBody>
+          <a:bodyPr wrap="none" rtlCol="0">
+            <a:spAutoFit/>
+          </a:bodyPr>
+          <a:lstStyle/>
+          <a:p>
+            <a:r>
+              <a:rPr lang="en-US" sz="1400" dirty="0"/>
+              <a:t>.then</a:t>
+            </a:r>
+          </a:p>
+        </p:txBody>
+      </p:sp>
+      <p:sp>
+        <p:nvSpPr>
+          <p:cNvPr id="20" name="Rectangle 19">
+            <a:extLst>
+              <a:ext uri="{FF2B5EF4-FFF2-40B4-BE49-F238E27FC236}">
+                <a16:creationId xmlns:a16="http://schemas.microsoft.com/office/drawing/2014/main" id="{5600785A-7B4F-1D49-8631-6407B513B99F}"/>
+              </a:ext>
+            </a:extLst>
+          </p:cNvPr>
+          <p:cNvSpPr/>
+          <p:nvPr/>
+        </p:nvSpPr>
+        <p:spPr>
+          <a:xfrm>
+            <a:off x="9024021" y="3637190"/>
+            <a:ext cx="651286" cy="473342"/>
+          </a:xfrm>
+          <a:prstGeom prst="rect">
+            <a:avLst/>
+          </a:prstGeom>
+        </p:spPr>
+        <p:style>
+          <a:lnRef idx="2">
+            <a:schemeClr val="accent2">
+              <a:shade val="50000"/>
+            </a:schemeClr>
+          </a:lnRef>
+          <a:fillRef idx="1">
+            <a:schemeClr val="accent2"/>
+          </a:fillRef>
+          <a:effectRef idx="0">
+            <a:schemeClr val="accent2"/>
+          </a:effectRef>
+          <a:fontRef idx="minor">
+            <a:schemeClr val="lt1"/>
+          </a:fontRef>
+        </p:style>
+        <p:txBody>
+          <a:bodyPr rtlCol="0" anchor="ctr"/>
+          <a:lstStyle/>
+          <a:p>
+            <a:pPr algn="ctr"/>
+            <a:r>
+              <a:rPr lang="en-US" dirty="0"/>
+              <a:t>0,1</a:t>
+            </a:r>
+          </a:p>
+        </p:txBody>
+      </p:sp>
+      <p:sp>
+        <p:nvSpPr>
+          <p:cNvPr id="21" name="Rectangle 20">
+            <a:extLst>
+              <a:ext uri="{FF2B5EF4-FFF2-40B4-BE49-F238E27FC236}">
+                <a16:creationId xmlns:a16="http://schemas.microsoft.com/office/drawing/2014/main" id="{11A681EC-1339-314B-9977-D3942BB9828E}"/>
+              </a:ext>
+            </a:extLst>
+          </p:cNvPr>
+          <p:cNvSpPr/>
+          <p:nvPr/>
+        </p:nvSpPr>
+        <p:spPr>
+          <a:xfrm>
+            <a:off x="9778515" y="3625423"/>
+            <a:ext cx="651286" cy="371112"/>
+          </a:xfrm>
+          <a:prstGeom prst="rect">
+            <a:avLst/>
+          </a:prstGeom>
+        </p:spPr>
+        <p:style>
+          <a:lnRef idx="1">
+            <a:schemeClr val="accent2"/>
+          </a:lnRef>
+          <a:fillRef idx="2">
+            <a:schemeClr val="accent2"/>
+          </a:fillRef>
+          <a:effectRef idx="1">
+            <a:schemeClr val="accent2"/>
+          </a:effectRef>
+          <a:fontRef idx="minor">
+            <a:schemeClr val="dk1"/>
+          </a:fontRef>
+        </p:style>
+        <p:txBody>
+          <a:bodyPr rtlCol="0" anchor="ctr"/>
+          <a:lstStyle/>
+          <a:p>
+            <a:pPr algn="ctr"/>
+            <a:r>
+              <a:rPr lang="en-US" dirty="0"/>
+              <a:t>2,1 n</a:t>
+            </a:r>
+          </a:p>
+        </p:txBody>
+      </p:sp>
+      <p:sp>
+        <p:nvSpPr>
+          <p:cNvPr id="22" name="Rectangle 21">
+            <a:extLst>
+              <a:ext uri="{FF2B5EF4-FFF2-40B4-BE49-F238E27FC236}">
+                <a16:creationId xmlns:a16="http://schemas.microsoft.com/office/drawing/2014/main" id="{601BCFCF-81C4-A440-9343-75259EE19217}"/>
+              </a:ext>
+            </a:extLst>
+          </p:cNvPr>
+          <p:cNvSpPr/>
+          <p:nvPr/>
+        </p:nvSpPr>
+        <p:spPr>
+          <a:xfrm>
+            <a:off x="10511602" y="3625423"/>
+            <a:ext cx="651286" cy="473342"/>
+          </a:xfrm>
+          <a:prstGeom prst="rect">
+            <a:avLst/>
+          </a:prstGeom>
+        </p:spPr>
+        <p:style>
+          <a:lnRef idx="2">
+            <a:schemeClr val="accent2">
+              <a:shade val="50000"/>
+            </a:schemeClr>
+          </a:lnRef>
+          <a:fillRef idx="1">
+            <a:schemeClr val="accent2"/>
+          </a:fillRef>
+          <a:effectRef idx="0">
+            <a:schemeClr val="accent2"/>
+          </a:effectRef>
+          <a:fontRef idx="minor">
+            <a:schemeClr val="lt1"/>
+          </a:fontRef>
+        </p:style>
+        <p:txBody>
+          <a:bodyPr rtlCol="0" anchor="ctr"/>
+          <a:lstStyle/>
+          <a:p>
+            <a:pPr algn="ctr"/>
+            <a:r>
+              <a:rPr lang="en-US" dirty="0"/>
+              <a:t>0,3</a:t>
+            </a:r>
+          </a:p>
+        </p:txBody>
+      </p:sp>
+      <p:sp>
+        <p:nvSpPr>
+          <p:cNvPr id="23" name="Rectangle 22">
+            <a:extLst>
+              <a:ext uri="{FF2B5EF4-FFF2-40B4-BE49-F238E27FC236}">
+                <a16:creationId xmlns:a16="http://schemas.microsoft.com/office/drawing/2014/main" id="{C2186A89-E97B-4042-9DEC-AEC3C6AAB225}"/>
+              </a:ext>
+            </a:extLst>
+          </p:cNvPr>
+          <p:cNvSpPr/>
+          <p:nvPr/>
+        </p:nvSpPr>
+        <p:spPr>
+          <a:xfrm>
+            <a:off x="11244688" y="3625423"/>
+            <a:ext cx="651286" cy="473342"/>
+          </a:xfrm>
+          <a:prstGeom prst="rect">
+            <a:avLst/>
+          </a:prstGeom>
+        </p:spPr>
+        <p:style>
+          <a:lnRef idx="2">
+            <a:schemeClr val="accent2">
+              <a:shade val="50000"/>
+            </a:schemeClr>
+          </a:lnRef>
+          <a:fillRef idx="1">
+            <a:schemeClr val="accent2"/>
+          </a:fillRef>
+          <a:effectRef idx="0">
+            <a:schemeClr val="accent2"/>
+          </a:effectRef>
+          <a:fontRef idx="minor">
+            <a:schemeClr val="lt1"/>
+          </a:fontRef>
+        </p:style>
+        <p:txBody>
+          <a:bodyPr rtlCol="0" anchor="ctr"/>
+          <a:lstStyle/>
+          <a:p>
+            <a:pPr algn="ctr"/>
+            <a:r>
+              <a:rPr lang="en-US" dirty="0"/>
+              <a:t>2,3</a:t>
+            </a:r>
+          </a:p>
+        </p:txBody>
+      </p:sp>
+      <p:sp>
+        <p:nvSpPr>
+          <p:cNvPr id="24" name="Rectangle 23">
+            <a:extLst>
+              <a:ext uri="{FF2B5EF4-FFF2-40B4-BE49-F238E27FC236}">
+                <a16:creationId xmlns:a16="http://schemas.microsoft.com/office/drawing/2014/main" id="{61746906-6AD5-1247-8D61-F1D80E89A3C2}"/>
+              </a:ext>
+            </a:extLst>
+          </p:cNvPr>
+          <p:cNvSpPr/>
+          <p:nvPr/>
+        </p:nvSpPr>
+        <p:spPr>
+          <a:xfrm>
+            <a:off x="9778515" y="3996535"/>
+            <a:ext cx="651286" cy="371112"/>
+          </a:xfrm>
+          <a:prstGeom prst="rect">
+            <a:avLst/>
+          </a:prstGeom>
+        </p:spPr>
+        <p:style>
+          <a:lnRef idx="2">
+            <a:schemeClr val="accent3">
+              <a:shade val="50000"/>
+            </a:schemeClr>
+          </a:lnRef>
+          <a:fillRef idx="1">
+            <a:schemeClr val="accent3"/>
+          </a:fillRef>
+          <a:effectRef idx="0">
+            <a:schemeClr val="accent3"/>
+          </a:effectRef>
+          <a:fontRef idx="minor">
+            <a:schemeClr val="lt1"/>
+          </a:fontRef>
+        </p:style>
+        <p:txBody>
+          <a:bodyPr rtlCol="0" anchor="ctr"/>
+          <a:lstStyle/>
+          <a:p>
+            <a:pPr algn="ctr"/>
+            <a:r>
+              <a:rPr lang="en-US" sz="1600" dirty="0"/>
+              <a:t>2,1 sf</a:t>
+            </a:r>
+          </a:p>
+        </p:txBody>
+      </p:sp>
+      <p:sp>
+        <p:nvSpPr>
+          <p:cNvPr id="31" name="Bent Arrow 30">
+            <a:extLst>
+              <a:ext uri="{FF2B5EF4-FFF2-40B4-BE49-F238E27FC236}">
+                <a16:creationId xmlns:a16="http://schemas.microsoft.com/office/drawing/2014/main" id="{41F16E01-3D46-1D48-9D88-86BC0922E525}"/>
+              </a:ext>
+            </a:extLst>
+          </p:cNvPr>
+          <p:cNvSpPr/>
+          <p:nvPr/>
+        </p:nvSpPr>
+        <p:spPr>
+          <a:xfrm rot="10800000" flipH="1">
+            <a:off x="10088648" y="4367647"/>
+            <a:ext cx="717747" cy="524159"/>
+          </a:xfrm>
+          <a:prstGeom prst="bentArrow">
+            <a:avLst>
+              <a:gd name="adj1" fmla="val 9409"/>
+              <a:gd name="adj2" fmla="val 17849"/>
+              <a:gd name="adj3" fmla="val 25000"/>
+              <a:gd name="adj4" fmla="val 43750"/>
+            </a:avLst>
+          </a:prstGeom>
+        </p:spPr>
+        <p:style>
+          <a:lnRef idx="2">
+            <a:schemeClr val="accent3">
+              <a:shade val="50000"/>
+            </a:schemeClr>
+          </a:lnRef>
+          <a:fillRef idx="1">
+            <a:schemeClr val="accent3"/>
+          </a:fillRef>
+          <a:effectRef idx="0">
+            <a:schemeClr val="accent3"/>
+          </a:effectRef>
+          <a:fontRef idx="minor">
+            <a:schemeClr val="lt1"/>
+          </a:fontRef>
+        </p:style>
+        <p:txBody>
+          <a:bodyPr rtlCol="0" anchor="ctr"/>
+          <a:lstStyle/>
+          <a:p>
+            <a:pPr algn="ctr"/>
+            <a:endParaRPr lang="en-US">
+              <a:solidFill>
+                <a:schemeClr val="tx1"/>
+              </a:solidFill>
+            </a:endParaRPr>
+          </a:p>
+        </p:txBody>
+      </p:sp>
+      <p:sp>
+        <p:nvSpPr>
+          <p:cNvPr id="32" name="TextBox 31">
+            <a:extLst>
+              <a:ext uri="{FF2B5EF4-FFF2-40B4-BE49-F238E27FC236}">
+                <a16:creationId xmlns:a16="http://schemas.microsoft.com/office/drawing/2014/main" id="{9BCB8B16-3399-9841-9814-A4FD836C7C41}"/>
+              </a:ext>
+            </a:extLst>
+          </p:cNvPr>
+          <p:cNvSpPr txBox="1"/>
+          <p:nvPr/>
+        </p:nvSpPr>
+        <p:spPr>
+          <a:xfrm>
+            <a:off x="10138485" y="4500103"/>
+            <a:ext cx="646203" cy="307777"/>
+          </a:xfrm>
+          <a:prstGeom prst="rect">
+            <a:avLst/>
+          </a:prstGeom>
+          <a:noFill/>
+        </p:spPr>
+        <p:txBody>
+          <a:bodyPr wrap="none" rtlCol="0">
+            <a:spAutoFit/>
+          </a:bodyPr>
+          <a:lstStyle/>
+          <a:p>
+            <a:r>
+              <a:rPr lang="en-US" sz="1400" dirty="0"/>
+              <a:t>return</a:t>
+            </a:r>
+          </a:p>
+        </p:txBody>
+      </p:sp>
+      <p:sp>
+        <p:nvSpPr>
+          <p:cNvPr id="7" name="Right Arrow 6">
+            <a:extLst>
+              <a:ext uri="{FF2B5EF4-FFF2-40B4-BE49-F238E27FC236}">
+                <a16:creationId xmlns:a16="http://schemas.microsoft.com/office/drawing/2014/main" id="{607D18EF-ACCC-4542-A7E7-53EE0892AFE2}"/>
+              </a:ext>
+            </a:extLst>
+          </p:cNvPr>
+          <p:cNvSpPr/>
+          <p:nvPr/>
+        </p:nvSpPr>
+        <p:spPr>
+          <a:xfrm>
+            <a:off x="10599173" y="2743600"/>
+            <a:ext cx="1472373" cy="176580"/>
+          </a:xfrm>
+          <a:prstGeom prst="rightArrow">
+            <a:avLst>
+              <a:gd name="adj1" fmla="val 26351"/>
+              <a:gd name="adj2" fmla="val 63346"/>
+            </a:avLst>
+          </a:prstGeom>
+        </p:spPr>
+        <p:style>
+          <a:lnRef idx="2">
+            <a:schemeClr val="accent3">
+              <a:shade val="50000"/>
+            </a:schemeClr>
+          </a:lnRef>
+          <a:fillRef idx="1">
+            <a:schemeClr val="accent3"/>
+          </a:fillRef>
+          <a:effectRef idx="0">
+            <a:schemeClr val="accent3"/>
+          </a:effectRef>
+          <a:fontRef idx="minor">
+            <a:schemeClr val="lt1"/>
+          </a:fontRef>
+        </p:style>
+        <p:txBody>
+          <a:bodyPr rtlCol="0" anchor="ctr"/>
+          <a:lstStyle/>
+          <a:p>
+            <a:pPr algn="ctr"/>
+            <a:endParaRPr lang="en-US"/>
+          </a:p>
+        </p:txBody>
+      </p:sp>
+      <p:sp>
+        <p:nvSpPr>
+          <p:cNvPr id="33" name="TextBox 32">
+            <a:extLst>
+              <a:ext uri="{FF2B5EF4-FFF2-40B4-BE49-F238E27FC236}">
+                <a16:creationId xmlns:a16="http://schemas.microsoft.com/office/drawing/2014/main" id="{E1E8F2E6-35BE-624E-B414-D322D77472C6}"/>
+              </a:ext>
+            </a:extLst>
+          </p:cNvPr>
+          <p:cNvSpPr txBox="1"/>
+          <p:nvPr/>
+        </p:nvSpPr>
+        <p:spPr>
+          <a:xfrm>
+            <a:off x="10599174" y="2542635"/>
+            <a:ext cx="1387496" cy="307777"/>
+          </a:xfrm>
+          <a:prstGeom prst="rect">
+            <a:avLst/>
+          </a:prstGeom>
+          <a:noFill/>
+        </p:spPr>
+        <p:txBody>
+          <a:bodyPr wrap="none" rtlCol="0">
+            <a:spAutoFit/>
+          </a:bodyPr>
+          <a:lstStyle/>
+          <a:p>
+            <a:r>
+              <a:rPr lang="en-US" sz="1400" dirty="0"/>
+              <a:t>store and return</a:t>
+            </a:r>
+          </a:p>
+        </p:txBody>
+      </p:sp>
+      <p:sp>
+        <p:nvSpPr>
+          <p:cNvPr id="8" name="TextBox 7">
+            <a:extLst>
+              <a:ext uri="{FF2B5EF4-FFF2-40B4-BE49-F238E27FC236}">
+                <a16:creationId xmlns:a16="http://schemas.microsoft.com/office/drawing/2014/main" id="{E190C30E-D824-5945-8C7E-3440F2042D4C}"/>
+              </a:ext>
+            </a:extLst>
+          </p:cNvPr>
+          <p:cNvSpPr txBox="1"/>
+          <p:nvPr/>
+        </p:nvSpPr>
+        <p:spPr>
+          <a:xfrm>
+            <a:off x="7058210" y="1301465"/>
+            <a:ext cx="2892395" cy="369332"/>
+          </a:xfrm>
+          <a:prstGeom prst="rect">
+            <a:avLst/>
+          </a:prstGeom>
+          <a:noFill/>
+        </p:spPr>
+        <p:txBody>
+          <a:bodyPr wrap="none" rtlCol="0">
+            <a:spAutoFit/>
+          </a:bodyPr>
+          <a:lstStyle/>
+          <a:p>
+            <a:r>
+              <a:rPr lang="en-US" dirty="0"/>
+              <a:t>First time (no shared future):</a:t>
+            </a:r>
+          </a:p>
+        </p:txBody>
+      </p:sp>
+      <p:sp>
+        <p:nvSpPr>
+          <p:cNvPr id="34" name="TextBox 33">
+            <a:extLst>
+              <a:ext uri="{FF2B5EF4-FFF2-40B4-BE49-F238E27FC236}">
+                <a16:creationId xmlns:a16="http://schemas.microsoft.com/office/drawing/2014/main" id="{D40BBB34-4D66-2241-A163-24B0EDB33458}"/>
+              </a:ext>
+            </a:extLst>
+          </p:cNvPr>
+          <p:cNvSpPr txBox="1"/>
+          <p:nvPr/>
+        </p:nvSpPr>
+        <p:spPr>
+          <a:xfrm>
+            <a:off x="7137661" y="3241139"/>
+            <a:ext cx="3450432" cy="369332"/>
+          </a:xfrm>
+          <a:prstGeom prst="rect">
+            <a:avLst/>
+          </a:prstGeom>
+          <a:noFill/>
+        </p:spPr>
+        <p:txBody>
+          <a:bodyPr wrap="none" rtlCol="0">
+            <a:spAutoFit/>
+          </a:bodyPr>
+          <a:lstStyle/>
+          <a:p>
+            <a:r>
+              <a:rPr lang="en-US" dirty="0"/>
+              <a:t>Second time (shared future exists):</a:t>
+            </a:r>
+          </a:p>
+        </p:txBody>
+      </p:sp>
+    </p:spTree>
+    <p:extLst>
+      <p:ext uri="{BB962C8B-B14F-4D97-AF65-F5344CB8AC3E}">
+        <p14:creationId xmlns:p14="http://schemas.microsoft.com/office/powerpoint/2010/main" val="273274377"/>
+      </p:ext>
+    </p:extLst>
+  </p:cSld>
+  <p:clrMapOvr>
+    <a:masterClrMapping/>
+  </p:clrMapOvr>
+</p:sld>
+</file>
+
+<file path=ppt/slides/slide12.xml><?xml version="1.0" encoding="utf-8"?>
+<p:sld xmlns:a="http://schemas.openxmlformats.org/drawingml/2006/main" xmlns:r="http://schemas.openxmlformats.org/officeDocument/2006/relationships" xmlns:p="http://schemas.openxmlformats.org/presentationml/2006/main">
+  <p:cSld>
+    <p:spTree>
+      <p:nvGrpSpPr>
+        <p:cNvPr id="1" name=""/>
+        <p:cNvGrpSpPr/>
+        <p:nvPr/>
+      </p:nvGrpSpPr>
+      <p:grpSpPr>
+        <a:xfrm>
+          <a:off x="0" y="0"/>
+          <a:ext cx="0" cy="0"/>
+          <a:chOff x="0" y="0"/>
+          <a:chExt cx="0" cy="0"/>
+        </a:xfrm>
+      </p:grpSpPr>
+      <p:sp>
+        <p:nvSpPr>
+          <p:cNvPr id="2" name="Title 1">
+            <a:extLst>
+              <a:ext uri="{FF2B5EF4-FFF2-40B4-BE49-F238E27FC236}">
+                <a16:creationId xmlns:a16="http://schemas.microsoft.com/office/drawing/2014/main" id="{CE0F46F3-BC9F-5644-AD8F-0CC76BAA1902}"/>
+              </a:ext>
+            </a:extLst>
+          </p:cNvPr>
+          <p:cNvSpPr>
+            <a:spLocks noGrp="1"/>
+          </p:cNvSpPr>
+          <p:nvPr>
+            <p:ph type="title"/>
+          </p:nvPr>
+        </p:nvSpPr>
+        <p:spPr>
+          <a:xfrm>
+            <a:off x="838200" y="365125"/>
+            <a:ext cx="10515600" cy="1325563"/>
+          </a:xfrm>
+        </p:spPr>
+        <p:txBody>
+          <a:bodyPr/>
+          <a:lstStyle/>
+          <a:p>
+            <a:r>
+              <a:rPr lang="en-US" dirty="0" err="1"/>
+              <a:t>MatrixRead</a:t>
+            </a:r>
+            <a:endParaRPr lang="en-US" dirty="0"/>
+          </a:p>
+        </p:txBody>
+      </p:sp>
+      <p:sp>
+        <p:nvSpPr>
+          <p:cNvPr id="3" name="Content Placeholder 2">
+            <a:extLst>
+              <a:ext uri="{FF2B5EF4-FFF2-40B4-BE49-F238E27FC236}">
+                <a16:creationId xmlns:a16="http://schemas.microsoft.com/office/drawing/2014/main" id="{8065CE91-9491-9143-A1E4-2BA3F3AA7BDA}"/>
+              </a:ext>
+            </a:extLst>
+          </p:cNvPr>
+          <p:cNvSpPr>
+            <a:spLocks noGrp="1"/>
+          </p:cNvSpPr>
+          <p:nvPr>
+            <p:ph idx="1"/>
+          </p:nvPr>
+        </p:nvSpPr>
+        <p:spPr/>
+        <p:txBody>
+          <a:bodyPr>
+            <a:normAutofit/>
+          </a:bodyPr>
+          <a:lstStyle/>
+          <a:p>
+            <a:r>
+              <a:rPr lang="en-US" sz="2400" dirty="0" err="1"/>
+              <a:t>MatrixRead</a:t>
+            </a:r>
+            <a:r>
+              <a:rPr lang="en-US" sz="2400" dirty="0"/>
+              <a:t> and </a:t>
+            </a:r>
+            <a:r>
+              <a:rPr lang="en-US" sz="2400" dirty="0" err="1"/>
+              <a:t>MatrixRW</a:t>
+            </a:r>
+            <a:r>
+              <a:rPr lang="en-US" sz="2400" dirty="0"/>
+              <a:t> allow a routine to schedule the computation tasks in a different task.</a:t>
+            </a:r>
+          </a:p>
+          <a:p>
+            <a:r>
+              <a:rPr lang="en-US" sz="2400" dirty="0" err="1"/>
+              <a:t>MatrixRead</a:t>
+            </a:r>
+            <a:r>
+              <a:rPr lang="en-US" sz="2400" dirty="0"/>
+              <a:t> creates all the shared futures and store a copy of them.</a:t>
+            </a:r>
+          </a:p>
+          <a:p>
+            <a:r>
+              <a:rPr lang="en-US" sz="2400" dirty="0"/>
+              <a:t>When the </a:t>
+            </a:r>
+            <a:r>
+              <a:rPr lang="en-US" sz="2400" dirty="0" err="1"/>
+              <a:t>MatrixRead</a:t>
+            </a:r>
+            <a:r>
+              <a:rPr lang="en-US" sz="2400" dirty="0"/>
+              <a:t> object is destructed (or done() is called) the local copy of the shared future is destroyed (Note: the Wrapper is destroyed only when all </a:t>
+            </a:r>
+            <a:r>
+              <a:rPr lang="en-US" sz="2400" dirty="0" err="1"/>
+              <a:t>shared_future</a:t>
+            </a:r>
+            <a:r>
+              <a:rPr lang="en-US" sz="2400" dirty="0"/>
+              <a:t> instances are destroyed).</a:t>
+            </a:r>
+          </a:p>
+          <a:p>
+            <a:r>
+              <a:rPr lang="en-US" sz="2400" dirty="0"/>
+              <a:t>Therefore:</a:t>
+            </a:r>
+          </a:p>
+          <a:p>
+            <a:pPr lvl="1"/>
+            <a:r>
+              <a:rPr lang="en-US" dirty="0"/>
+              <a:t>Reads of the original Matrix and of </a:t>
+            </a:r>
+            <a:r>
+              <a:rPr lang="en-US" dirty="0" err="1"/>
+              <a:t>MatrixRead</a:t>
+            </a:r>
+            <a:r>
+              <a:rPr lang="en-US" dirty="0"/>
+              <a:t> can be concurrent</a:t>
+            </a:r>
+          </a:p>
+          <a:p>
+            <a:pPr lvl="1"/>
+            <a:r>
+              <a:rPr lang="en-US" dirty="0"/>
+              <a:t>Writes of the original Matrix needs to wait the end of all read operation. (when no more shared future of the given Tile exists)</a:t>
+            </a:r>
+          </a:p>
+        </p:txBody>
+      </p:sp>
+    </p:spTree>
+    <p:extLst>
+      <p:ext uri="{BB962C8B-B14F-4D97-AF65-F5344CB8AC3E}">
+        <p14:creationId xmlns:p14="http://schemas.microsoft.com/office/powerpoint/2010/main" val="858475380"/>
+      </p:ext>
+    </p:extLst>
+  </p:cSld>
+  <p:clrMapOvr>
+    <a:masterClrMapping/>
+  </p:clrMapOvr>
+</p:sld>
+</file>
+
+<file path=ppt/slides/slide13.xml><?xml version="1.0" encoding="utf-8"?>
+<p:sld xmlns:a="http://schemas.openxmlformats.org/drawingml/2006/main" xmlns:r="http://schemas.openxmlformats.org/officeDocument/2006/relationships" xmlns:p="http://schemas.openxmlformats.org/presentationml/2006/main">
+  <p:cSld>
+    <p:spTree>
+      <p:nvGrpSpPr>
+        <p:cNvPr id="1" name=""/>
+        <p:cNvGrpSpPr/>
+        <p:nvPr/>
+      </p:nvGrpSpPr>
+      <p:grpSpPr>
+        <a:xfrm>
+          <a:off x="0" y="0"/>
+          <a:ext cx="0" cy="0"/>
+          <a:chOff x="0" y="0"/>
+          <a:chExt cx="0" cy="0"/>
+        </a:xfrm>
+      </p:grpSpPr>
+      <p:sp>
+        <p:nvSpPr>
+          <p:cNvPr id="2" name="Title 1">
+            <a:extLst>
+              <a:ext uri="{FF2B5EF4-FFF2-40B4-BE49-F238E27FC236}">
+                <a16:creationId xmlns:a16="http://schemas.microsoft.com/office/drawing/2014/main" id="{CE0F46F3-BC9F-5644-AD8F-0CC76BAA1902}"/>
+              </a:ext>
+            </a:extLst>
+          </p:cNvPr>
+          <p:cNvSpPr>
+            <a:spLocks noGrp="1"/>
+          </p:cNvSpPr>
+          <p:nvPr>
+            <p:ph type="title"/>
+          </p:nvPr>
+        </p:nvSpPr>
+        <p:spPr>
+          <a:xfrm>
+            <a:off x="838200" y="365125"/>
+            <a:ext cx="10515600" cy="1325563"/>
+          </a:xfrm>
+        </p:spPr>
+        <p:txBody>
+          <a:bodyPr/>
+          <a:lstStyle/>
+          <a:p>
+            <a:r>
+              <a:rPr lang="en-US" dirty="0" err="1"/>
+              <a:t>MatrixRW</a:t>
+            </a:r>
+            <a:endParaRPr lang="en-US" dirty="0"/>
+          </a:p>
+        </p:txBody>
+      </p:sp>
+      <p:sp>
+        <p:nvSpPr>
+          <p:cNvPr id="3" name="Content Placeholder 2">
+            <a:extLst>
+              <a:ext uri="{FF2B5EF4-FFF2-40B4-BE49-F238E27FC236}">
+                <a16:creationId xmlns:a16="http://schemas.microsoft.com/office/drawing/2014/main" id="{8065CE91-9491-9143-A1E4-2BA3F3AA7BDA}"/>
+              </a:ext>
+            </a:extLst>
+          </p:cNvPr>
+          <p:cNvSpPr>
+            <a:spLocks noGrp="1"/>
+          </p:cNvSpPr>
+          <p:nvPr>
+            <p:ph idx="1"/>
+          </p:nvPr>
+        </p:nvSpPr>
+        <p:spPr/>
+        <p:txBody>
+          <a:bodyPr>
+            <a:normAutofit/>
+          </a:bodyPr>
+          <a:lstStyle/>
+          <a:p>
+            <a:r>
+              <a:rPr lang="en-US" sz="2400" dirty="0" err="1"/>
+              <a:t>MatrixRW</a:t>
+            </a:r>
+            <a:r>
+              <a:rPr lang="en-US" sz="2400" dirty="0"/>
+              <a:t> moves all the futures and shared future of the original Matrix and replace them with promise futures which are stored by </a:t>
+            </a:r>
+            <a:r>
+              <a:rPr lang="en-US" sz="2400" dirty="0" err="1"/>
+              <a:t>MatrixRW</a:t>
+            </a:r>
+            <a:r>
+              <a:rPr lang="en-US" sz="2400" dirty="0"/>
+              <a:t>.</a:t>
+            </a:r>
+          </a:p>
+          <a:p>
+            <a:r>
+              <a:rPr lang="en-US" sz="2400" dirty="0"/>
+              <a:t>When the </a:t>
+            </a:r>
+            <a:r>
+              <a:rPr lang="en-US" sz="2400" dirty="0" err="1"/>
+              <a:t>MatrixRW</a:t>
+            </a:r>
+            <a:r>
+              <a:rPr lang="en-US" sz="2400" dirty="0"/>
+              <a:t> object is destructed (or done() is called) the local copy of the shared future is destroyed and the future of the original Matrix will be set with the value of </a:t>
+            </a:r>
+            <a:r>
+              <a:rPr lang="en-US" sz="2400" dirty="0" err="1"/>
+              <a:t>MatrixRW</a:t>
+            </a:r>
+            <a:r>
+              <a:rPr lang="en-US" sz="2400" dirty="0"/>
+              <a:t> current future.</a:t>
+            </a:r>
+          </a:p>
+          <a:p>
+            <a:r>
+              <a:rPr lang="en-US" sz="2400" dirty="0"/>
+              <a:t>Therefore:</a:t>
+            </a:r>
+          </a:p>
+          <a:p>
+            <a:pPr lvl="1"/>
+            <a:r>
+              <a:rPr lang="en-US" dirty="0"/>
+              <a:t>Reads of the original Matrix and reads of </a:t>
+            </a:r>
+            <a:r>
+              <a:rPr lang="en-US" dirty="0" err="1"/>
+              <a:t>MatrixRW</a:t>
+            </a:r>
+            <a:r>
+              <a:rPr lang="en-US" dirty="0"/>
+              <a:t> after </a:t>
+            </a:r>
+            <a:r>
+              <a:rPr lang="en-US" dirty="0" err="1"/>
+              <a:t>doneWrite</a:t>
+            </a:r>
+            <a:r>
+              <a:rPr lang="en-US" dirty="0"/>
+              <a:t>() is called can be concurrent.</a:t>
+            </a:r>
+          </a:p>
+          <a:p>
+            <a:pPr lvl="1"/>
+            <a:r>
+              <a:rPr lang="en-US" dirty="0"/>
+              <a:t>Writes of the original Matrix needs to wait the end of all operation scheduled using </a:t>
+            </a:r>
+            <a:r>
+              <a:rPr lang="en-US" dirty="0" err="1"/>
+              <a:t>MatrixRW</a:t>
+            </a:r>
+            <a:r>
+              <a:rPr lang="en-US" dirty="0"/>
+              <a:t>.</a:t>
+            </a:r>
+          </a:p>
+        </p:txBody>
+      </p:sp>
+    </p:spTree>
+    <p:extLst>
+      <p:ext uri="{BB962C8B-B14F-4D97-AF65-F5344CB8AC3E}">
+        <p14:creationId xmlns:p14="http://schemas.microsoft.com/office/powerpoint/2010/main" val="1259577013"/>
+      </p:ext>
+    </p:extLst>
+  </p:cSld>
+  <p:clrMapOvr>
+    <a:masterClrMapping/>
+  </p:clrMapOvr>
+</p:sld>
+</file>
+
 <file path=ppt/slides/slide2.xml><?xml version="1.0" encoding="utf-8"?>
 <p:sld xmlns:a="http://schemas.openxmlformats.org/drawingml/2006/main" xmlns:r="http://schemas.openxmlformats.org/officeDocument/2006/relationships" xmlns:p="http://schemas.openxmlformats.org/presentationml/2006/main">
   <p:cSld>
@@ -4436,8 +7776,8 @@
         </p:nvCxnSpPr>
         <p:spPr>
           <a:xfrm>
-            <a:off x="10579578" y="3891794"/>
-            <a:ext cx="92248" cy="1091685"/>
+            <a:off x="10349797" y="3337560"/>
+            <a:ext cx="322029" cy="1645919"/>
           </a:xfrm>
           <a:prstGeom prst="straightConnector1">
             <a:avLst/>
@@ -4527,50 +7867,6 @@
           <a:xfrm flipH="1">
             <a:off x="4164573" y="5532123"/>
             <a:ext cx="187448" cy="548634"/>
-          </a:xfrm>
-          <a:prstGeom prst="straightConnector1">
-            <a:avLst/>
-          </a:prstGeom>
-          <a:ln w="38100">
-            <a:solidFill>
-              <a:schemeClr val="accent4"/>
-            </a:solidFill>
-            <a:tailEnd type="triangle"/>
-          </a:ln>
-        </p:spPr>
-        <p:style>
-          <a:lnRef idx="1">
-            <a:schemeClr val="accent1"/>
-          </a:lnRef>
-          <a:fillRef idx="0">
-            <a:schemeClr val="accent1"/>
-          </a:fillRef>
-          <a:effectRef idx="0">
-            <a:schemeClr val="accent1"/>
-          </a:effectRef>
-          <a:fontRef idx="minor">
-            <a:schemeClr val="tx1"/>
-          </a:fontRef>
-        </p:style>
-      </p:cxnSp>
-      <p:cxnSp>
-        <p:nvCxnSpPr>
-          <p:cNvPr id="84" name="Straight Arrow Connector 83">
-            <a:extLst>
-              <a:ext uri="{FF2B5EF4-FFF2-40B4-BE49-F238E27FC236}">
-                <a16:creationId xmlns:a16="http://schemas.microsoft.com/office/drawing/2014/main" id="{8907B7E1-13CA-094F-9396-ABF5AA0AB646}"/>
-              </a:ext>
-            </a:extLst>
-          </p:cNvPr>
-          <p:cNvCxnSpPr>
-            <a:cxnSpLocks/>
-          </p:cNvCxnSpPr>
-          <p:nvPr/>
-        </p:nvCxnSpPr>
-        <p:spPr>
-          <a:xfrm flipH="1">
-            <a:off x="8575289" y="2251479"/>
-            <a:ext cx="450926" cy="2732000"/>
           </a:xfrm>
           <a:prstGeom prst="straightConnector1">
             <a:avLst/>
@@ -5342,7 +8638,7 @@
         </p:nvSpPr>
         <p:spPr>
           <a:xfrm>
-            <a:off x="9669989" y="3343155"/>
+            <a:off x="9440208" y="2788921"/>
             <a:ext cx="1819178" cy="548639"/>
           </a:xfrm>
           <a:prstGeom prst="roundRect">
@@ -5408,8 +8704,8 @@
         </p:nvCxnSpPr>
         <p:spPr>
           <a:xfrm flipH="1">
-            <a:off x="8671671" y="3891794"/>
-            <a:ext cx="1337212" cy="1091685"/>
+            <a:off x="8671672" y="3340357"/>
+            <a:ext cx="1337211" cy="1643122"/>
           </a:xfrm>
           <a:prstGeom prst="straightConnector1">
             <a:avLst/>
@@ -5453,8 +8749,8 @@
         </p:nvCxnSpPr>
         <p:spPr>
           <a:xfrm>
-            <a:off x="9260028" y="2251479"/>
-            <a:ext cx="1319550" cy="1091676"/>
+            <a:off x="9192900" y="2234911"/>
+            <a:ext cx="1156897" cy="554010"/>
           </a:xfrm>
           <a:prstGeom prst="straightConnector1">
             <a:avLst/>
@@ -5553,6 +8849,50 @@
           <a:ln w="38100">
             <a:solidFill>
               <a:schemeClr val="accent1"/>
+            </a:solidFill>
+            <a:tailEnd type="triangle"/>
+          </a:ln>
+        </p:spPr>
+        <p:style>
+          <a:lnRef idx="1">
+            <a:schemeClr val="accent1"/>
+          </a:lnRef>
+          <a:fillRef idx="0">
+            <a:schemeClr val="accent1"/>
+          </a:fillRef>
+          <a:effectRef idx="0">
+            <a:schemeClr val="accent1"/>
+          </a:effectRef>
+          <a:fontRef idx="minor">
+            <a:schemeClr val="tx1"/>
+          </a:fontRef>
+        </p:style>
+      </p:cxnSp>
+      <p:cxnSp>
+        <p:nvCxnSpPr>
+          <p:cNvPr id="60" name="Straight Arrow Connector 59">
+            <a:extLst>
+              <a:ext uri="{FF2B5EF4-FFF2-40B4-BE49-F238E27FC236}">
+                <a16:creationId xmlns:a16="http://schemas.microsoft.com/office/drawing/2014/main" id="{93EACEA8-A998-CB4B-9503-90403A88B8A5}"/>
+              </a:ext>
+            </a:extLst>
+          </p:cNvPr>
+          <p:cNvCxnSpPr>
+            <a:cxnSpLocks/>
+          </p:cNvCxnSpPr>
+          <p:nvPr/>
+        </p:nvCxnSpPr>
+        <p:spPr>
+          <a:xfrm flipH="1">
+            <a:off x="8575290" y="3348748"/>
+            <a:ext cx="954583" cy="545619"/>
+          </a:xfrm>
+          <a:prstGeom prst="straightConnector1">
+            <a:avLst/>
+          </a:prstGeom>
+          <a:ln w="38100">
+            <a:solidFill>
+              <a:schemeClr val="accent4"/>
             </a:solidFill>
             <a:tailEnd type="triangle"/>
           </a:ln>
@@ -7137,7 +10477,9 @@
         </p:nvSpPr>
         <p:spPr/>
         <p:txBody>
-          <a:bodyPr/>
+          <a:bodyPr>
+            <a:normAutofit/>
+          </a:bodyPr>
           <a:lstStyle/>
           <a:p>
             <a:r>
@@ -7168,7 +10510,7 @@
             </a:r>
             <a:r>
               <a:rPr lang="en-US" dirty="0" err="1"/>
-              <a:t>tileA</a:t>
+              <a:t>tile_a</a:t>
             </a:r>
             <a:r>
               <a:rPr lang="en-US" dirty="0"/>
@@ -7176,7 +10518,7 @@
             </a:r>
             <a:r>
               <a:rPr lang="en-US" dirty="0" err="1"/>
-              <a:t>tileB</a:t>
+              <a:t>tile_b</a:t>
             </a:r>
             <a:r>
               <a:rPr lang="en-US" dirty="0"/>
@@ -7184,11 +10526,89 @@
             </a:r>
             <a:r>
               <a:rPr lang="en-US" dirty="0" err="1"/>
-              <a:t>tileC</a:t>
+              <a:t>tile_c</a:t>
             </a:r>
             <a:r>
               <a:rPr lang="en-US" dirty="0"/>
               <a:t>)</a:t>
+            </a:r>
+          </a:p>
+          <a:p>
+            <a:pPr lvl="1"/>
+            <a:r>
+              <a:rPr lang="en-US" dirty="0" err="1"/>
+              <a:t>tile_a</a:t>
+            </a:r>
+            <a:r>
+              <a:rPr lang="en-US" dirty="0"/>
+              <a:t>, </a:t>
+            </a:r>
+            <a:r>
+              <a:rPr lang="en-US" dirty="0" err="1"/>
+              <a:t>tile_b</a:t>
+            </a:r>
+            <a:r>
+              <a:rPr lang="en-US" dirty="0"/>
+              <a:t> are </a:t>
+            </a:r>
+            <a:r>
+              <a:rPr lang="en-US" dirty="0" err="1"/>
+              <a:t>const</a:t>
+            </a:r>
+            <a:r>
+              <a:rPr lang="en-US" dirty="0"/>
+              <a:t> Tile&amp; and </a:t>
+            </a:r>
+            <a:r>
+              <a:rPr lang="en-US" dirty="0" err="1"/>
+              <a:t>tile_c</a:t>
+            </a:r>
+            <a:r>
+              <a:rPr lang="en-US" dirty="0"/>
+              <a:t> is Tile&amp;</a:t>
+            </a:r>
+          </a:p>
+          <a:p>
+            <a:pPr lvl="1"/>
+            <a:r>
+              <a:rPr lang="en-US" dirty="0" err="1"/>
+              <a:t>tile_a</a:t>
+            </a:r>
+            <a:r>
+              <a:rPr lang="en-US" dirty="0"/>
+              <a:t>, </a:t>
+            </a:r>
+            <a:r>
+              <a:rPr lang="en-US" dirty="0" err="1"/>
+              <a:t>tile_b</a:t>
+            </a:r>
+            <a:r>
+              <a:rPr lang="en-US" dirty="0"/>
+              <a:t> are </a:t>
+            </a:r>
+            <a:r>
+              <a:rPr lang="en-US" dirty="0" err="1"/>
+              <a:t>const</a:t>
+            </a:r>
+            <a:r>
+              <a:rPr lang="en-US" dirty="0"/>
+              <a:t> Wrapper&lt;</a:t>
+            </a:r>
+            <a:r>
+              <a:rPr lang="en-US"/>
+              <a:t>Tile&gt;&amp; </a:t>
+            </a:r>
+            <a:r>
+              <a:rPr lang="en-US" dirty="0"/>
+              <a:t>and </a:t>
+            </a:r>
+            <a:r>
+              <a:rPr lang="en-US" dirty="0" err="1"/>
+              <a:t>tile_c</a:t>
+            </a:r>
+            <a:r>
+              <a:rPr lang="en-US" dirty="0"/>
+              <a:t> is Wrapper&lt;Tile&gt;&amp;&amp;.</a:t>
             </a:r>
           </a:p>
           <a:p>
@@ -7565,6 +10985,903 @@
     <p:extLst>
       <p:ext uri="{BB962C8B-B14F-4D97-AF65-F5344CB8AC3E}">
         <p14:creationId xmlns:p14="http://schemas.microsoft.com/office/powerpoint/2010/main" val="950295917"/>
+      </p:ext>
+    </p:extLst>
+  </p:cSld>
+  <p:clrMapOvr>
+    <a:masterClrMapping/>
+  </p:clrMapOvr>
+</p:sld>
+</file>
+
+<file path=ppt/slides/slide9.xml><?xml version="1.0" encoding="utf-8"?>
+<p:sld xmlns:a="http://schemas.openxmlformats.org/drawingml/2006/main" xmlns:r="http://schemas.openxmlformats.org/officeDocument/2006/relationships" xmlns:p="http://schemas.openxmlformats.org/presentationml/2006/main">
+  <p:cSld>
+    <p:spTree>
+      <p:nvGrpSpPr>
+        <p:cNvPr id="1" name=""/>
+        <p:cNvGrpSpPr/>
+        <p:nvPr/>
+      </p:nvGrpSpPr>
+      <p:grpSpPr>
+        <a:xfrm>
+          <a:off x="0" y="0"/>
+          <a:ext cx="0" cy="0"/>
+          <a:chOff x="0" y="0"/>
+          <a:chExt cx="0" cy="0"/>
+        </a:xfrm>
+      </p:grpSpPr>
+      <p:sp>
+        <p:nvSpPr>
+          <p:cNvPr id="2" name="Title 1">
+            <a:extLst>
+              <a:ext uri="{FF2B5EF4-FFF2-40B4-BE49-F238E27FC236}">
+                <a16:creationId xmlns:a16="http://schemas.microsoft.com/office/drawing/2014/main" id="{CE0F46F3-BC9F-5644-AD8F-0CC76BAA1902}"/>
+              </a:ext>
+            </a:extLst>
+          </p:cNvPr>
+          <p:cNvSpPr>
+            <a:spLocks noGrp="1"/>
+          </p:cNvSpPr>
+          <p:nvPr>
+            <p:ph type="title"/>
+          </p:nvPr>
+        </p:nvSpPr>
+        <p:spPr>
+          <a:xfrm>
+            <a:off x="838200" y="365125"/>
+            <a:ext cx="10515600" cy="1325563"/>
+          </a:xfrm>
+        </p:spPr>
+        <p:txBody>
+          <a:bodyPr/>
+          <a:lstStyle/>
+          <a:p>
+            <a:r>
+              <a:rPr lang="en-US" dirty="0"/>
+              <a:t>How the matrix of future works</a:t>
+            </a:r>
+          </a:p>
+        </p:txBody>
+      </p:sp>
+      <p:sp>
+        <p:nvSpPr>
+          <p:cNvPr id="3" name="Content Placeholder 2">
+            <a:extLst>
+              <a:ext uri="{FF2B5EF4-FFF2-40B4-BE49-F238E27FC236}">
+                <a16:creationId xmlns:a16="http://schemas.microsoft.com/office/drawing/2014/main" id="{8065CE91-9491-9143-A1E4-2BA3F3AA7BDA}"/>
+              </a:ext>
+            </a:extLst>
+          </p:cNvPr>
+          <p:cNvSpPr>
+            <a:spLocks noGrp="1"/>
+          </p:cNvSpPr>
+          <p:nvPr>
+            <p:ph idx="1"/>
+          </p:nvPr>
+        </p:nvSpPr>
+        <p:spPr/>
+        <p:txBody>
+          <a:bodyPr>
+            <a:normAutofit/>
+          </a:bodyPr>
+          <a:lstStyle/>
+          <a:p>
+            <a:r>
+              <a:rPr lang="en-US" dirty="0"/>
+              <a:t>Matrix is 2D block cyclic distributed.</a:t>
+            </a:r>
+          </a:p>
+          <a:p>
+            <a:r>
+              <a:rPr lang="en-US" dirty="0"/>
+              <a:t>Each local tile is represented by a future</a:t>
+            </a:r>
+            <a:br>
+              <a:rPr lang="en-US" dirty="0"/>
+            </a:br>
+            <a:r>
+              <a:rPr lang="en-US" dirty="0"/>
+              <a:t>and a pointer to a shared future</a:t>
+            </a:r>
+            <a:br>
+              <a:rPr lang="en-US" dirty="0"/>
+            </a:br>
+            <a:r>
+              <a:rPr lang="en-US" dirty="0"/>
+              <a:t>(used when the task only reads the tile)</a:t>
+            </a:r>
+          </a:p>
+        </p:txBody>
+      </p:sp>
+      <p:sp>
+        <p:nvSpPr>
+          <p:cNvPr id="4" name="Rectangle 3">
+            <a:extLst>
+              <a:ext uri="{FF2B5EF4-FFF2-40B4-BE49-F238E27FC236}">
+                <a16:creationId xmlns:a16="http://schemas.microsoft.com/office/drawing/2014/main" id="{E42AF247-8642-434D-8553-48D6201BE1F4}"/>
+              </a:ext>
+            </a:extLst>
+          </p:cNvPr>
+          <p:cNvSpPr/>
+          <p:nvPr/>
+        </p:nvSpPr>
+        <p:spPr>
+          <a:xfrm>
+            <a:off x="7702475" y="2151528"/>
+            <a:ext cx="774551" cy="710005"/>
+          </a:xfrm>
+          <a:prstGeom prst="rect">
+            <a:avLst/>
+          </a:prstGeom>
+        </p:spPr>
+        <p:style>
+          <a:lnRef idx="2">
+            <a:schemeClr val="accent1">
+              <a:shade val="50000"/>
+            </a:schemeClr>
+          </a:lnRef>
+          <a:fillRef idx="1">
+            <a:schemeClr val="accent1"/>
+          </a:fillRef>
+          <a:effectRef idx="0">
+            <a:schemeClr val="accent1"/>
+          </a:effectRef>
+          <a:fontRef idx="minor">
+            <a:schemeClr val="lt1"/>
+          </a:fontRef>
+        </p:style>
+        <p:txBody>
+          <a:bodyPr rtlCol="0" anchor="ctr"/>
+          <a:lstStyle/>
+          <a:p>
+            <a:pPr algn="ctr"/>
+            <a:r>
+              <a:rPr lang="en-US" dirty="0"/>
+              <a:t>0,0</a:t>
+            </a:r>
+          </a:p>
+        </p:txBody>
+      </p:sp>
+      <p:sp>
+        <p:nvSpPr>
+          <p:cNvPr id="5" name="Rectangle 4">
+            <a:extLst>
+              <a:ext uri="{FF2B5EF4-FFF2-40B4-BE49-F238E27FC236}">
+                <a16:creationId xmlns:a16="http://schemas.microsoft.com/office/drawing/2014/main" id="{3B54EB16-7A5B-8A43-9817-9997554CD933}"/>
+              </a:ext>
+            </a:extLst>
+          </p:cNvPr>
+          <p:cNvSpPr/>
+          <p:nvPr/>
+        </p:nvSpPr>
+        <p:spPr>
+          <a:xfrm>
+            <a:off x="8477025" y="2151523"/>
+            <a:ext cx="774551" cy="710005"/>
+          </a:xfrm>
+          <a:prstGeom prst="rect">
+            <a:avLst/>
+          </a:prstGeom>
+        </p:spPr>
+        <p:style>
+          <a:lnRef idx="2">
+            <a:schemeClr val="accent2">
+              <a:shade val="50000"/>
+            </a:schemeClr>
+          </a:lnRef>
+          <a:fillRef idx="1">
+            <a:schemeClr val="accent2"/>
+          </a:fillRef>
+          <a:effectRef idx="0">
+            <a:schemeClr val="accent2"/>
+          </a:effectRef>
+          <a:fontRef idx="minor">
+            <a:schemeClr val="lt1"/>
+          </a:fontRef>
+        </p:style>
+        <p:txBody>
+          <a:bodyPr rtlCol="0" anchor="ctr"/>
+          <a:lstStyle/>
+          <a:p>
+            <a:pPr algn="ctr"/>
+            <a:r>
+              <a:rPr lang="en-US" dirty="0"/>
+              <a:t>0,1</a:t>
+            </a:r>
+          </a:p>
+        </p:txBody>
+      </p:sp>
+      <p:sp>
+        <p:nvSpPr>
+          <p:cNvPr id="6" name="Rectangle 5">
+            <a:extLst>
+              <a:ext uri="{FF2B5EF4-FFF2-40B4-BE49-F238E27FC236}">
+                <a16:creationId xmlns:a16="http://schemas.microsoft.com/office/drawing/2014/main" id="{923B16CE-0AC4-E347-9F4C-14C29B21D3DD}"/>
+              </a:ext>
+            </a:extLst>
+          </p:cNvPr>
+          <p:cNvSpPr/>
+          <p:nvPr/>
+        </p:nvSpPr>
+        <p:spPr>
+          <a:xfrm>
+            <a:off x="7702475" y="2861532"/>
+            <a:ext cx="774551" cy="710005"/>
+          </a:xfrm>
+          <a:prstGeom prst="rect">
+            <a:avLst/>
+          </a:prstGeom>
+        </p:spPr>
+        <p:style>
+          <a:lnRef idx="2">
+            <a:schemeClr val="accent4">
+              <a:shade val="50000"/>
+            </a:schemeClr>
+          </a:lnRef>
+          <a:fillRef idx="1">
+            <a:schemeClr val="accent4"/>
+          </a:fillRef>
+          <a:effectRef idx="0">
+            <a:schemeClr val="accent4"/>
+          </a:effectRef>
+          <a:fontRef idx="minor">
+            <a:schemeClr val="lt1"/>
+          </a:fontRef>
+        </p:style>
+        <p:txBody>
+          <a:bodyPr rtlCol="0" anchor="ctr"/>
+          <a:lstStyle/>
+          <a:p>
+            <a:pPr algn="ctr"/>
+            <a:r>
+              <a:rPr lang="en-US" dirty="0"/>
+              <a:t>1,0</a:t>
+            </a:r>
+          </a:p>
+        </p:txBody>
+      </p:sp>
+      <p:sp>
+        <p:nvSpPr>
+          <p:cNvPr id="7" name="Rectangle 6">
+            <a:extLst>
+              <a:ext uri="{FF2B5EF4-FFF2-40B4-BE49-F238E27FC236}">
+                <a16:creationId xmlns:a16="http://schemas.microsoft.com/office/drawing/2014/main" id="{11A19E98-8515-AD4A-84A7-D5229B7D201D}"/>
+              </a:ext>
+            </a:extLst>
+          </p:cNvPr>
+          <p:cNvSpPr/>
+          <p:nvPr/>
+        </p:nvSpPr>
+        <p:spPr>
+          <a:xfrm>
+            <a:off x="8477025" y="2861532"/>
+            <a:ext cx="774551" cy="710005"/>
+          </a:xfrm>
+          <a:prstGeom prst="rect">
+            <a:avLst/>
+          </a:prstGeom>
+        </p:spPr>
+        <p:style>
+          <a:lnRef idx="2">
+            <a:schemeClr val="accent6">
+              <a:shade val="50000"/>
+            </a:schemeClr>
+          </a:lnRef>
+          <a:fillRef idx="1">
+            <a:schemeClr val="accent6"/>
+          </a:fillRef>
+          <a:effectRef idx="0">
+            <a:schemeClr val="accent6"/>
+          </a:effectRef>
+          <a:fontRef idx="minor">
+            <a:schemeClr val="lt1"/>
+          </a:fontRef>
+        </p:style>
+        <p:txBody>
+          <a:bodyPr rtlCol="0" anchor="ctr"/>
+          <a:lstStyle/>
+          <a:p>
+            <a:pPr algn="ctr"/>
+            <a:r>
+              <a:rPr lang="en-US" dirty="0"/>
+              <a:t>1,1</a:t>
+            </a:r>
+          </a:p>
+        </p:txBody>
+      </p:sp>
+      <p:sp>
+        <p:nvSpPr>
+          <p:cNvPr id="9" name="Rectangle 8">
+            <a:extLst>
+              <a:ext uri="{FF2B5EF4-FFF2-40B4-BE49-F238E27FC236}">
+                <a16:creationId xmlns:a16="http://schemas.microsoft.com/office/drawing/2014/main" id="{62FF41B5-E3B9-9A41-8361-7C03E09A597F}"/>
+              </a:ext>
+            </a:extLst>
+          </p:cNvPr>
+          <p:cNvSpPr/>
+          <p:nvPr/>
+        </p:nvSpPr>
+        <p:spPr>
+          <a:xfrm>
+            <a:off x="7702475" y="3571538"/>
+            <a:ext cx="774551" cy="710005"/>
+          </a:xfrm>
+          <a:prstGeom prst="rect">
+            <a:avLst/>
+          </a:prstGeom>
+        </p:spPr>
+        <p:style>
+          <a:lnRef idx="2">
+            <a:schemeClr val="accent1">
+              <a:shade val="50000"/>
+            </a:schemeClr>
+          </a:lnRef>
+          <a:fillRef idx="1">
+            <a:schemeClr val="accent1"/>
+          </a:fillRef>
+          <a:effectRef idx="0">
+            <a:schemeClr val="accent1"/>
+          </a:effectRef>
+          <a:fontRef idx="minor">
+            <a:schemeClr val="lt1"/>
+          </a:fontRef>
+        </p:style>
+        <p:txBody>
+          <a:bodyPr rtlCol="0" anchor="ctr"/>
+          <a:lstStyle/>
+          <a:p>
+            <a:pPr algn="ctr"/>
+            <a:r>
+              <a:rPr lang="en-US" dirty="0"/>
+              <a:t>2,0</a:t>
+            </a:r>
+          </a:p>
+        </p:txBody>
+      </p:sp>
+      <p:sp>
+        <p:nvSpPr>
+          <p:cNvPr id="10" name="Rectangle 9">
+            <a:extLst>
+              <a:ext uri="{FF2B5EF4-FFF2-40B4-BE49-F238E27FC236}">
+                <a16:creationId xmlns:a16="http://schemas.microsoft.com/office/drawing/2014/main" id="{F9613E89-3C6D-834E-A737-1A05FB110829}"/>
+              </a:ext>
+            </a:extLst>
+          </p:cNvPr>
+          <p:cNvSpPr/>
+          <p:nvPr/>
+        </p:nvSpPr>
+        <p:spPr>
+          <a:xfrm>
+            <a:off x="8477026" y="3571537"/>
+            <a:ext cx="774551" cy="710005"/>
+          </a:xfrm>
+          <a:prstGeom prst="rect">
+            <a:avLst/>
+          </a:prstGeom>
+        </p:spPr>
+        <p:style>
+          <a:lnRef idx="2">
+            <a:schemeClr val="accent2">
+              <a:shade val="50000"/>
+            </a:schemeClr>
+          </a:lnRef>
+          <a:fillRef idx="1">
+            <a:schemeClr val="accent2"/>
+          </a:fillRef>
+          <a:effectRef idx="0">
+            <a:schemeClr val="accent2"/>
+          </a:effectRef>
+          <a:fontRef idx="minor">
+            <a:schemeClr val="lt1"/>
+          </a:fontRef>
+        </p:style>
+        <p:txBody>
+          <a:bodyPr rtlCol="0" anchor="ctr"/>
+          <a:lstStyle/>
+          <a:p>
+            <a:pPr algn="ctr"/>
+            <a:r>
+              <a:rPr lang="en-US" dirty="0"/>
+              <a:t>2,1</a:t>
+            </a:r>
+          </a:p>
+        </p:txBody>
+      </p:sp>
+      <p:sp>
+        <p:nvSpPr>
+          <p:cNvPr id="11" name="Rectangle 10">
+            <a:extLst>
+              <a:ext uri="{FF2B5EF4-FFF2-40B4-BE49-F238E27FC236}">
+                <a16:creationId xmlns:a16="http://schemas.microsoft.com/office/drawing/2014/main" id="{68E0E322-42B6-D346-888E-85A96DB605E1}"/>
+              </a:ext>
+            </a:extLst>
+          </p:cNvPr>
+          <p:cNvSpPr/>
+          <p:nvPr/>
+        </p:nvSpPr>
+        <p:spPr>
+          <a:xfrm>
+            <a:off x="7702475" y="4281542"/>
+            <a:ext cx="774551" cy="710005"/>
+          </a:xfrm>
+          <a:prstGeom prst="rect">
+            <a:avLst/>
+          </a:prstGeom>
+        </p:spPr>
+        <p:style>
+          <a:lnRef idx="2">
+            <a:schemeClr val="accent4">
+              <a:shade val="50000"/>
+            </a:schemeClr>
+          </a:lnRef>
+          <a:fillRef idx="1">
+            <a:schemeClr val="accent4"/>
+          </a:fillRef>
+          <a:effectRef idx="0">
+            <a:schemeClr val="accent4"/>
+          </a:effectRef>
+          <a:fontRef idx="minor">
+            <a:schemeClr val="lt1"/>
+          </a:fontRef>
+        </p:style>
+        <p:txBody>
+          <a:bodyPr rtlCol="0" anchor="ctr"/>
+          <a:lstStyle/>
+          <a:p>
+            <a:pPr algn="ctr"/>
+            <a:r>
+              <a:rPr lang="en-US" dirty="0"/>
+              <a:t>3,0</a:t>
+            </a:r>
+          </a:p>
+        </p:txBody>
+      </p:sp>
+      <p:sp>
+        <p:nvSpPr>
+          <p:cNvPr id="12" name="Rectangle 11">
+            <a:extLst>
+              <a:ext uri="{FF2B5EF4-FFF2-40B4-BE49-F238E27FC236}">
+                <a16:creationId xmlns:a16="http://schemas.microsoft.com/office/drawing/2014/main" id="{DBE44F78-E3B6-5348-8054-E25E23989708}"/>
+              </a:ext>
+            </a:extLst>
+          </p:cNvPr>
+          <p:cNvSpPr/>
+          <p:nvPr/>
+        </p:nvSpPr>
+        <p:spPr>
+          <a:xfrm>
+            <a:off x="8477025" y="4281542"/>
+            <a:ext cx="774551" cy="710005"/>
+          </a:xfrm>
+          <a:prstGeom prst="rect">
+            <a:avLst/>
+          </a:prstGeom>
+        </p:spPr>
+        <p:style>
+          <a:lnRef idx="2">
+            <a:schemeClr val="accent6">
+              <a:shade val="50000"/>
+            </a:schemeClr>
+          </a:lnRef>
+          <a:fillRef idx="1">
+            <a:schemeClr val="accent6"/>
+          </a:fillRef>
+          <a:effectRef idx="0">
+            <a:schemeClr val="accent6"/>
+          </a:effectRef>
+          <a:fontRef idx="minor">
+            <a:schemeClr val="lt1"/>
+          </a:fontRef>
+        </p:style>
+        <p:txBody>
+          <a:bodyPr rtlCol="0" anchor="ctr"/>
+          <a:lstStyle/>
+          <a:p>
+            <a:pPr algn="ctr"/>
+            <a:r>
+              <a:rPr lang="en-US" dirty="0"/>
+              <a:t>3,1</a:t>
+            </a:r>
+          </a:p>
+        </p:txBody>
+      </p:sp>
+      <p:sp>
+        <p:nvSpPr>
+          <p:cNvPr id="13" name="Rectangle 12">
+            <a:extLst>
+              <a:ext uri="{FF2B5EF4-FFF2-40B4-BE49-F238E27FC236}">
+                <a16:creationId xmlns:a16="http://schemas.microsoft.com/office/drawing/2014/main" id="{2D6ADD26-335B-544E-A791-0EB9B95F0F88}"/>
+              </a:ext>
+            </a:extLst>
+          </p:cNvPr>
+          <p:cNvSpPr/>
+          <p:nvPr/>
+        </p:nvSpPr>
+        <p:spPr>
+          <a:xfrm>
+            <a:off x="9251576" y="2151526"/>
+            <a:ext cx="774551" cy="710005"/>
+          </a:xfrm>
+          <a:prstGeom prst="rect">
+            <a:avLst/>
+          </a:prstGeom>
+        </p:spPr>
+        <p:style>
+          <a:lnRef idx="2">
+            <a:schemeClr val="accent1">
+              <a:shade val="50000"/>
+            </a:schemeClr>
+          </a:lnRef>
+          <a:fillRef idx="1">
+            <a:schemeClr val="accent1"/>
+          </a:fillRef>
+          <a:effectRef idx="0">
+            <a:schemeClr val="accent1"/>
+          </a:effectRef>
+          <a:fontRef idx="minor">
+            <a:schemeClr val="lt1"/>
+          </a:fontRef>
+        </p:style>
+        <p:txBody>
+          <a:bodyPr rtlCol="0" anchor="ctr"/>
+          <a:lstStyle/>
+          <a:p>
+            <a:pPr algn="ctr"/>
+            <a:r>
+              <a:rPr lang="en-US" dirty="0"/>
+              <a:t>0,2</a:t>
+            </a:r>
+          </a:p>
+        </p:txBody>
+      </p:sp>
+      <p:sp>
+        <p:nvSpPr>
+          <p:cNvPr id="14" name="Rectangle 13">
+            <a:extLst>
+              <a:ext uri="{FF2B5EF4-FFF2-40B4-BE49-F238E27FC236}">
+                <a16:creationId xmlns:a16="http://schemas.microsoft.com/office/drawing/2014/main" id="{8377B2CB-A14F-7647-90C7-D2F4420145D2}"/>
+              </a:ext>
+            </a:extLst>
+          </p:cNvPr>
+          <p:cNvSpPr/>
+          <p:nvPr/>
+        </p:nvSpPr>
+        <p:spPr>
+          <a:xfrm>
+            <a:off x="10026127" y="2151525"/>
+            <a:ext cx="774551" cy="710005"/>
+          </a:xfrm>
+          <a:prstGeom prst="rect">
+            <a:avLst/>
+          </a:prstGeom>
+        </p:spPr>
+        <p:style>
+          <a:lnRef idx="2">
+            <a:schemeClr val="accent2">
+              <a:shade val="50000"/>
+            </a:schemeClr>
+          </a:lnRef>
+          <a:fillRef idx="1">
+            <a:schemeClr val="accent2"/>
+          </a:fillRef>
+          <a:effectRef idx="0">
+            <a:schemeClr val="accent2"/>
+          </a:effectRef>
+          <a:fontRef idx="minor">
+            <a:schemeClr val="lt1"/>
+          </a:fontRef>
+        </p:style>
+        <p:txBody>
+          <a:bodyPr rtlCol="0" anchor="ctr"/>
+          <a:lstStyle/>
+          <a:p>
+            <a:pPr algn="ctr"/>
+            <a:r>
+              <a:rPr lang="en-US" dirty="0"/>
+              <a:t>0,3</a:t>
+            </a:r>
+          </a:p>
+        </p:txBody>
+      </p:sp>
+      <p:sp>
+        <p:nvSpPr>
+          <p:cNvPr id="15" name="Rectangle 14">
+            <a:extLst>
+              <a:ext uri="{FF2B5EF4-FFF2-40B4-BE49-F238E27FC236}">
+                <a16:creationId xmlns:a16="http://schemas.microsoft.com/office/drawing/2014/main" id="{7522E31C-7749-0645-A684-DCADD3DD6178}"/>
+              </a:ext>
+            </a:extLst>
+          </p:cNvPr>
+          <p:cNvSpPr/>
+          <p:nvPr/>
+        </p:nvSpPr>
+        <p:spPr>
+          <a:xfrm>
+            <a:off x="9251576" y="2861530"/>
+            <a:ext cx="774551" cy="710005"/>
+          </a:xfrm>
+          <a:prstGeom prst="rect">
+            <a:avLst/>
+          </a:prstGeom>
+        </p:spPr>
+        <p:style>
+          <a:lnRef idx="2">
+            <a:schemeClr val="accent4">
+              <a:shade val="50000"/>
+            </a:schemeClr>
+          </a:lnRef>
+          <a:fillRef idx="1">
+            <a:schemeClr val="accent4"/>
+          </a:fillRef>
+          <a:effectRef idx="0">
+            <a:schemeClr val="accent4"/>
+          </a:effectRef>
+          <a:fontRef idx="minor">
+            <a:schemeClr val="lt1"/>
+          </a:fontRef>
+        </p:style>
+        <p:txBody>
+          <a:bodyPr rtlCol="0" anchor="ctr"/>
+          <a:lstStyle/>
+          <a:p>
+            <a:pPr algn="ctr"/>
+            <a:r>
+              <a:rPr lang="en-US" dirty="0"/>
+              <a:t>1,2</a:t>
+            </a:r>
+          </a:p>
+        </p:txBody>
+      </p:sp>
+      <p:sp>
+        <p:nvSpPr>
+          <p:cNvPr id="16" name="Rectangle 15">
+            <a:extLst>
+              <a:ext uri="{FF2B5EF4-FFF2-40B4-BE49-F238E27FC236}">
+                <a16:creationId xmlns:a16="http://schemas.microsoft.com/office/drawing/2014/main" id="{A6853174-E321-8D4C-89AB-018ADA3B694A}"/>
+              </a:ext>
+            </a:extLst>
+          </p:cNvPr>
+          <p:cNvSpPr/>
+          <p:nvPr/>
+        </p:nvSpPr>
+        <p:spPr>
+          <a:xfrm>
+            <a:off x="10026126" y="2861530"/>
+            <a:ext cx="774551" cy="710005"/>
+          </a:xfrm>
+          <a:prstGeom prst="rect">
+            <a:avLst/>
+          </a:prstGeom>
+        </p:spPr>
+        <p:style>
+          <a:lnRef idx="2">
+            <a:schemeClr val="accent6">
+              <a:shade val="50000"/>
+            </a:schemeClr>
+          </a:lnRef>
+          <a:fillRef idx="1">
+            <a:schemeClr val="accent6"/>
+          </a:fillRef>
+          <a:effectRef idx="0">
+            <a:schemeClr val="accent6"/>
+          </a:effectRef>
+          <a:fontRef idx="minor">
+            <a:schemeClr val="lt1"/>
+          </a:fontRef>
+        </p:style>
+        <p:txBody>
+          <a:bodyPr rtlCol="0" anchor="ctr"/>
+          <a:lstStyle/>
+          <a:p>
+            <a:pPr algn="ctr"/>
+            <a:r>
+              <a:rPr lang="en-US" dirty="0"/>
+              <a:t>1,3</a:t>
+            </a:r>
+          </a:p>
+        </p:txBody>
+      </p:sp>
+      <p:sp>
+        <p:nvSpPr>
+          <p:cNvPr id="17" name="Rectangle 16">
+            <a:extLst>
+              <a:ext uri="{FF2B5EF4-FFF2-40B4-BE49-F238E27FC236}">
+                <a16:creationId xmlns:a16="http://schemas.microsoft.com/office/drawing/2014/main" id="{387ACEE7-A2F6-D948-AB44-FB7F5DA47714}"/>
+              </a:ext>
+            </a:extLst>
+          </p:cNvPr>
+          <p:cNvSpPr/>
+          <p:nvPr/>
+        </p:nvSpPr>
+        <p:spPr>
+          <a:xfrm>
+            <a:off x="9251575" y="3571537"/>
+            <a:ext cx="774551" cy="710005"/>
+          </a:xfrm>
+          <a:prstGeom prst="rect">
+            <a:avLst/>
+          </a:prstGeom>
+        </p:spPr>
+        <p:style>
+          <a:lnRef idx="2">
+            <a:schemeClr val="accent1">
+              <a:shade val="50000"/>
+            </a:schemeClr>
+          </a:lnRef>
+          <a:fillRef idx="1">
+            <a:schemeClr val="accent1"/>
+          </a:fillRef>
+          <a:effectRef idx="0">
+            <a:schemeClr val="accent1"/>
+          </a:effectRef>
+          <a:fontRef idx="minor">
+            <a:schemeClr val="lt1"/>
+          </a:fontRef>
+        </p:style>
+        <p:txBody>
+          <a:bodyPr rtlCol="0" anchor="ctr"/>
+          <a:lstStyle/>
+          <a:p>
+            <a:pPr algn="ctr"/>
+            <a:r>
+              <a:rPr lang="en-US" dirty="0"/>
+              <a:t>2,2</a:t>
+            </a:r>
+          </a:p>
+        </p:txBody>
+      </p:sp>
+      <p:sp>
+        <p:nvSpPr>
+          <p:cNvPr id="18" name="Rectangle 17">
+            <a:extLst>
+              <a:ext uri="{FF2B5EF4-FFF2-40B4-BE49-F238E27FC236}">
+                <a16:creationId xmlns:a16="http://schemas.microsoft.com/office/drawing/2014/main" id="{14DA06FB-82C0-B24B-858E-FC6EDBA48007}"/>
+              </a:ext>
+            </a:extLst>
+          </p:cNvPr>
+          <p:cNvSpPr/>
+          <p:nvPr/>
+        </p:nvSpPr>
+        <p:spPr>
+          <a:xfrm>
+            <a:off x="10026126" y="3571536"/>
+            <a:ext cx="774551" cy="710005"/>
+          </a:xfrm>
+          <a:prstGeom prst="rect">
+            <a:avLst/>
+          </a:prstGeom>
+        </p:spPr>
+        <p:style>
+          <a:lnRef idx="2">
+            <a:schemeClr val="accent2">
+              <a:shade val="50000"/>
+            </a:schemeClr>
+          </a:lnRef>
+          <a:fillRef idx="1">
+            <a:schemeClr val="accent2"/>
+          </a:fillRef>
+          <a:effectRef idx="0">
+            <a:schemeClr val="accent2"/>
+          </a:effectRef>
+          <a:fontRef idx="minor">
+            <a:schemeClr val="lt1"/>
+          </a:fontRef>
+        </p:style>
+        <p:txBody>
+          <a:bodyPr rtlCol="0" anchor="ctr"/>
+          <a:lstStyle/>
+          <a:p>
+            <a:pPr algn="ctr"/>
+            <a:r>
+              <a:rPr lang="en-US" dirty="0"/>
+              <a:t>2,3</a:t>
+            </a:r>
+          </a:p>
+        </p:txBody>
+      </p:sp>
+      <p:sp>
+        <p:nvSpPr>
+          <p:cNvPr id="19" name="Rectangle 18">
+            <a:extLst>
+              <a:ext uri="{FF2B5EF4-FFF2-40B4-BE49-F238E27FC236}">
+                <a16:creationId xmlns:a16="http://schemas.microsoft.com/office/drawing/2014/main" id="{E5866E09-2982-754B-B23B-E09E92980CE6}"/>
+              </a:ext>
+            </a:extLst>
+          </p:cNvPr>
+          <p:cNvSpPr/>
+          <p:nvPr/>
+        </p:nvSpPr>
+        <p:spPr>
+          <a:xfrm>
+            <a:off x="9251575" y="4281541"/>
+            <a:ext cx="774551" cy="710005"/>
+          </a:xfrm>
+          <a:prstGeom prst="rect">
+            <a:avLst/>
+          </a:prstGeom>
+        </p:spPr>
+        <p:style>
+          <a:lnRef idx="2">
+            <a:schemeClr val="accent4">
+              <a:shade val="50000"/>
+            </a:schemeClr>
+          </a:lnRef>
+          <a:fillRef idx="1">
+            <a:schemeClr val="accent4"/>
+          </a:fillRef>
+          <a:effectRef idx="0">
+            <a:schemeClr val="accent4"/>
+          </a:effectRef>
+          <a:fontRef idx="minor">
+            <a:schemeClr val="lt1"/>
+          </a:fontRef>
+        </p:style>
+        <p:txBody>
+          <a:bodyPr rtlCol="0" anchor="ctr"/>
+          <a:lstStyle/>
+          <a:p>
+            <a:pPr algn="ctr"/>
+            <a:r>
+              <a:rPr lang="en-US" dirty="0"/>
+              <a:t>2,3</a:t>
+            </a:r>
+          </a:p>
+        </p:txBody>
+      </p:sp>
+      <p:sp>
+        <p:nvSpPr>
+          <p:cNvPr id="20" name="Rectangle 19">
+            <a:extLst>
+              <a:ext uri="{FF2B5EF4-FFF2-40B4-BE49-F238E27FC236}">
+                <a16:creationId xmlns:a16="http://schemas.microsoft.com/office/drawing/2014/main" id="{FAD4A8A4-A091-914A-9D1A-98979A6E529B}"/>
+              </a:ext>
+            </a:extLst>
+          </p:cNvPr>
+          <p:cNvSpPr/>
+          <p:nvPr/>
+        </p:nvSpPr>
+        <p:spPr>
+          <a:xfrm>
+            <a:off x="10026125" y="4281541"/>
+            <a:ext cx="774551" cy="710005"/>
+          </a:xfrm>
+          <a:prstGeom prst="rect">
+            <a:avLst/>
+          </a:prstGeom>
+        </p:spPr>
+        <p:style>
+          <a:lnRef idx="2">
+            <a:schemeClr val="accent6">
+              <a:shade val="50000"/>
+            </a:schemeClr>
+          </a:lnRef>
+          <a:fillRef idx="1">
+            <a:schemeClr val="accent6"/>
+          </a:fillRef>
+          <a:effectRef idx="0">
+            <a:schemeClr val="accent6"/>
+          </a:effectRef>
+          <a:fontRef idx="minor">
+            <a:schemeClr val="lt1"/>
+          </a:fontRef>
+        </p:style>
+        <p:txBody>
+          <a:bodyPr rtlCol="0" anchor="ctr"/>
+          <a:lstStyle/>
+          <a:p>
+            <a:pPr algn="ctr"/>
+            <a:r>
+              <a:rPr lang="en-US" dirty="0"/>
+              <a:t>3,3</a:t>
+            </a:r>
+          </a:p>
+        </p:txBody>
+      </p:sp>
+    </p:spTree>
+    <p:extLst>
+      <p:ext uri="{BB962C8B-B14F-4D97-AF65-F5344CB8AC3E}">
+        <p14:creationId xmlns:p14="http://schemas.microsoft.com/office/powerpoint/2010/main" val="76412395"/>
       </p:ext>
     </p:extLst>
   </p:cSld>
@@ -7867,4 +12184,299 @@
     </a:ext>
   </a:extLst>
 </a:theme>
+</file>
+
+<file path=ppt/theme/theme2.xml><?xml version="1.0" encoding="utf-8"?>
+<a:theme xmlns:a="http://schemas.openxmlformats.org/drawingml/2006/main" name="Office Theme">
+  <a:themeElements>
+    <a:clrScheme name="Office">
+      <a:dk1>
+        <a:sysClr val="windowText" lastClr="000000"/>
+      </a:dk1>
+      <a:lt1>
+        <a:sysClr val="window" lastClr="FFFFFF"/>
+      </a:lt1>
+      <a:dk2>
+        <a:srgbClr val="44546A"/>
+      </a:dk2>
+      <a:lt2>
+        <a:srgbClr val="E7E6E6"/>
+      </a:lt2>
+      <a:accent1>
+        <a:srgbClr val="4472C4"/>
+      </a:accent1>
+      <a:accent2>
+        <a:srgbClr val="ED7D31"/>
+      </a:accent2>
+      <a:accent3>
+        <a:srgbClr val="A5A5A5"/>
+      </a:accent3>
+      <a:accent4>
+        <a:srgbClr val="FFC000"/>
+      </a:accent4>
+      <a:accent5>
+        <a:srgbClr val="5B9BD5"/>
+      </a:accent5>
+      <a:accent6>
+        <a:srgbClr val="70AD47"/>
+      </a:accent6>
+      <a:hlink>
+        <a:srgbClr val="0563C1"/>
+      </a:hlink>
+      <a:folHlink>
+        <a:srgbClr val="954F72"/>
+      </a:folHlink>
+    </a:clrScheme>
+    <a:fontScheme name="Office">
+      <a:majorFont>
+        <a:latin typeface="Calibri Light" panose="020F0302020204030204"/>
+        <a:ea typeface=""/>
+        <a:cs typeface=""/>
+        <a:font script="Jpan" typeface="游ゴシック Light"/>
+        <a:font script="Hang" typeface="맑은 고딕"/>
+        <a:font script="Hans" typeface="等线 Light"/>
+        <a:font script="Hant" typeface="新細明體"/>
+        <a:font script="Arab" typeface="Times New Roman"/>
+        <a:font script="Hebr" typeface="Times New Roman"/>
+        <a:font script="Thai" typeface="Angsana New"/>
+        <a:font script="Ethi" typeface="Nyala"/>
+        <a:font script="Beng" typeface="Vrinda"/>
+        <a:font script="Gujr" typeface="Shruti"/>
+        <a:font script="Khmr" typeface="MoolBoran"/>
+        <a:font script="Knda" typeface="Tunga"/>
+        <a:font script="Guru" typeface="Raavi"/>
+        <a:font script="Cans" typeface="Euphemia"/>
+        <a:font script="Cher" typeface="Plantagenet Cherokee"/>
+        <a:font script="Yiii" typeface="Microsoft Yi Baiti"/>
+        <a:font script="Tibt" typeface="Microsoft Himalaya"/>
+        <a:font script="Thaa" typeface="MV Boli"/>
+        <a:font script="Deva" typeface="Mangal"/>
+        <a:font script="Telu" typeface="Gautami"/>
+        <a:font script="Taml" typeface="Latha"/>
+        <a:font script="Syrc" typeface="Estrangelo Edessa"/>
+        <a:font script="Orya" typeface="Kalinga"/>
+        <a:font script="Mlym" typeface="Kartika"/>
+        <a:font script="Laoo" typeface="DokChampa"/>
+        <a:font script="Sinh" typeface="Iskoola Pota"/>
+        <a:font script="Mong" typeface="Mongolian Baiti"/>
+        <a:font script="Viet" typeface="Times New Roman"/>
+        <a:font script="Uigh" typeface="Microsoft Uighur"/>
+        <a:font script="Geor" typeface="Sylfaen"/>
+        <a:font script="Armn" typeface="Arial"/>
+        <a:font script="Bugi" typeface="Leelawadee UI"/>
+        <a:font script="Bopo" typeface="Microsoft JhengHei"/>
+        <a:font script="Java" typeface="Javanese Text"/>
+        <a:font script="Lisu" typeface="Segoe UI"/>
+        <a:font script="Mymr" typeface="Myanmar Text"/>
+        <a:font script="Nkoo" typeface="Ebrima"/>
+        <a:font script="Olck" typeface="Nirmala UI"/>
+        <a:font script="Osma" typeface="Ebrima"/>
+        <a:font script="Phag" typeface="Phagspa"/>
+        <a:font script="Syrn" typeface="Estrangelo Edessa"/>
+        <a:font script="Syrj" typeface="Estrangelo Edessa"/>
+        <a:font script="Syre" typeface="Estrangelo Edessa"/>
+        <a:font script="Sora" typeface="Nirmala UI"/>
+        <a:font script="Tale" typeface="Microsoft Tai Le"/>
+        <a:font script="Talu" typeface="Microsoft New Tai Lue"/>
+        <a:font script="Tfng" typeface="Ebrima"/>
+      </a:majorFont>
+      <a:minorFont>
+        <a:latin typeface="Calibri" panose="020F0502020204030204"/>
+        <a:ea typeface=""/>
+        <a:cs typeface=""/>
+        <a:font script="Jpan" typeface="游ゴシック"/>
+        <a:font script="Hang" typeface="맑은 고딕"/>
+        <a:font script="Hans" typeface="等线"/>
+        <a:font script="Hant" typeface="新細明體"/>
+        <a:font script="Arab" typeface="Arial"/>
+        <a:font script="Hebr" typeface="Arial"/>
+        <a:font script="Thai" typeface="Cordia New"/>
+        <a:font script="Ethi" typeface="Nyala"/>
+        <a:font script="Beng" typeface="Vrinda"/>
+        <a:font script="Gujr" typeface="Shruti"/>
+        <a:font script="Khmr" typeface="DaunPenh"/>
+        <a:font script="Knda" typeface="Tunga"/>
+        <a:font script="Guru" typeface="Raavi"/>
+        <a:font script="Cans" typeface="Euphemia"/>
+        <a:font script="Cher" typeface="Plantagenet Cherokee"/>
+        <a:font script="Yiii" typeface="Microsoft Yi Baiti"/>
+        <a:font script="Tibt" typeface="Microsoft Himalaya"/>
+        <a:font script="Thaa" typeface="MV Boli"/>
+        <a:font script="Deva" typeface="Mangal"/>
+        <a:font script="Telu" typeface="Gautami"/>
+        <a:font script="Taml" typeface="Latha"/>
+        <a:font script="Syrc" typeface="Estrangelo Edessa"/>
+        <a:font script="Orya" typeface="Kalinga"/>
+        <a:font script="Mlym" typeface="Kartika"/>
+        <a:font script="Laoo" typeface="DokChampa"/>
+        <a:font script="Sinh" typeface="Iskoola Pota"/>
+        <a:font script="Mong" typeface="Mongolian Baiti"/>
+        <a:font script="Viet" typeface="Arial"/>
+        <a:font script="Uigh" typeface="Microsoft Uighur"/>
+        <a:font script="Geor" typeface="Sylfaen"/>
+        <a:font script="Armn" typeface="Arial"/>
+        <a:font script="Bugi" typeface="Leelawadee UI"/>
+        <a:font script="Bopo" typeface="Microsoft JhengHei"/>
+        <a:font script="Java" typeface="Javanese Text"/>
+        <a:font script="Lisu" typeface="Segoe UI"/>
+        <a:font script="Mymr" typeface="Myanmar Text"/>
+        <a:font script="Nkoo" typeface="Ebrima"/>
+        <a:font script="Olck" typeface="Nirmala UI"/>
+        <a:font script="Osma" typeface="Ebrima"/>
+        <a:font script="Phag" typeface="Phagspa"/>
+        <a:font script="Syrn" typeface="Estrangelo Edessa"/>
+        <a:font script="Syrj" typeface="Estrangelo Edessa"/>
+        <a:font script="Syre" typeface="Estrangelo Edessa"/>
+        <a:font script="Sora" typeface="Nirmala UI"/>
+        <a:font script="Tale" typeface="Microsoft Tai Le"/>
+        <a:font script="Talu" typeface="Microsoft New Tai Lue"/>
+        <a:font script="Tfng" typeface="Ebrima"/>
+      </a:minorFont>
+    </a:fontScheme>
+    <a:fmtScheme name="Office">
+      <a:fillStyleLst>
+        <a:solidFill>
+          <a:schemeClr val="phClr"/>
+        </a:solidFill>
+        <a:gradFill rotWithShape="1">
+          <a:gsLst>
+            <a:gs pos="0">
+              <a:schemeClr val="phClr">
+                <a:lumMod val="110000"/>
+                <a:satMod val="105000"/>
+                <a:tint val="67000"/>
+              </a:schemeClr>
+            </a:gs>
+            <a:gs pos="50000">
+              <a:schemeClr val="phClr">
+                <a:lumMod val="105000"/>
+                <a:satMod val="103000"/>
+                <a:tint val="73000"/>
+              </a:schemeClr>
+            </a:gs>
+            <a:gs pos="100000">
+              <a:schemeClr val="phClr">
+                <a:lumMod val="105000"/>
+                <a:satMod val="109000"/>
+                <a:tint val="81000"/>
+              </a:schemeClr>
+            </a:gs>
+          </a:gsLst>
+          <a:lin ang="5400000" scaled="0"/>
+        </a:gradFill>
+        <a:gradFill rotWithShape="1">
+          <a:gsLst>
+            <a:gs pos="0">
+              <a:schemeClr val="phClr">
+                <a:satMod val="103000"/>
+                <a:lumMod val="102000"/>
+                <a:tint val="94000"/>
+              </a:schemeClr>
+            </a:gs>
+            <a:gs pos="50000">
+              <a:schemeClr val="phClr">
+                <a:satMod val="110000"/>
+                <a:lumMod val="100000"/>
+                <a:shade val="100000"/>
+              </a:schemeClr>
+            </a:gs>
+            <a:gs pos="100000">
+              <a:schemeClr val="phClr">
+                <a:lumMod val="99000"/>
+                <a:satMod val="120000"/>
+                <a:shade val="78000"/>
+              </a:schemeClr>
+            </a:gs>
+          </a:gsLst>
+          <a:lin ang="5400000" scaled="0"/>
+        </a:gradFill>
+      </a:fillStyleLst>
+      <a:lnStyleLst>
+        <a:ln w="6350" cap="flat" cmpd="sng" algn="ctr">
+          <a:solidFill>
+            <a:schemeClr val="phClr"/>
+          </a:solidFill>
+          <a:prstDash val="solid"/>
+          <a:miter lim="800000"/>
+        </a:ln>
+        <a:ln w="12700" cap="flat" cmpd="sng" algn="ctr">
+          <a:solidFill>
+            <a:schemeClr val="phClr"/>
+          </a:solidFill>
+          <a:prstDash val="solid"/>
+          <a:miter lim="800000"/>
+        </a:ln>
+        <a:ln w="19050" cap="flat" cmpd="sng" algn="ctr">
+          <a:solidFill>
+            <a:schemeClr val="phClr"/>
+          </a:solidFill>
+          <a:prstDash val="solid"/>
+          <a:miter lim="800000"/>
+        </a:ln>
+      </a:lnStyleLst>
+      <a:effectStyleLst>
+        <a:effectStyle>
+          <a:effectLst/>
+        </a:effectStyle>
+        <a:effectStyle>
+          <a:effectLst/>
+        </a:effectStyle>
+        <a:effectStyle>
+          <a:effectLst>
+            <a:outerShdw blurRad="57150" dist="19050" dir="5400000" algn="ctr" rotWithShape="0">
+              <a:srgbClr val="000000">
+                <a:alpha val="63000"/>
+              </a:srgbClr>
+            </a:outerShdw>
+          </a:effectLst>
+        </a:effectStyle>
+      </a:effectStyleLst>
+      <a:bgFillStyleLst>
+        <a:solidFill>
+          <a:schemeClr val="phClr"/>
+        </a:solidFill>
+        <a:solidFill>
+          <a:schemeClr val="phClr">
+            <a:tint val="95000"/>
+            <a:satMod val="170000"/>
+          </a:schemeClr>
+        </a:solidFill>
+        <a:gradFill rotWithShape="1">
+          <a:gsLst>
+            <a:gs pos="0">
+              <a:schemeClr val="phClr">
+                <a:tint val="93000"/>
+                <a:satMod val="150000"/>
+                <a:shade val="98000"/>
+                <a:lumMod val="102000"/>
+              </a:schemeClr>
+            </a:gs>
+            <a:gs pos="50000">
+              <a:schemeClr val="phClr">
+                <a:tint val="98000"/>
+                <a:satMod val="130000"/>
+                <a:shade val="90000"/>
+                <a:lumMod val="103000"/>
+              </a:schemeClr>
+            </a:gs>
+            <a:gs pos="100000">
+              <a:schemeClr val="phClr">
+                <a:shade val="63000"/>
+                <a:satMod val="120000"/>
+              </a:schemeClr>
+            </a:gs>
+          </a:gsLst>
+          <a:lin ang="5400000" scaled="0"/>
+        </a:gradFill>
+      </a:bgFillStyleLst>
+    </a:fmtScheme>
+  </a:themeElements>
+  <a:objectDefaults/>
+  <a:extraClrSchemeLst/>
+  <a:extLst>
+    <a:ext uri="{05A4C25C-085E-4340-85A3-A5531E510DB2}">
+      <thm15:themeFamily xmlns:thm15="http://schemas.microsoft.com/office/thememl/2012/main" name="Office Theme" id="{62F939B6-93AF-4DB8-9C6B-D6C7DFDC589F}" vid="{4A3C46E8-61CC-4603-A589-7422A47A8E4A}"/>
+    </a:ext>
+  </a:extLst>
+</a:theme>
 </file>
</xml_diff>